<commit_message>
[week3] update pptx, homework
</commit_message>
<xml_diff>
--- a/Week3/week 3.pptx
+++ b/Week3/week 3.pptx
@@ -5,34 +5,36 @@
     <p:sldMasterId id="2147483660" r:id="rId1"/>
   </p:sldMasterIdLst>
   <p:notesMasterIdLst>
-    <p:notesMasterId r:id="rId27"/>
+    <p:notesMasterId r:id="rId29"/>
   </p:notesMasterIdLst>
   <p:sldIdLst>
     <p:sldId id="256" r:id="rId2"/>
     <p:sldId id="281" r:id="rId3"/>
-    <p:sldId id="283" r:id="rId4"/>
-    <p:sldId id="284" r:id="rId5"/>
-    <p:sldId id="282" r:id="rId6"/>
-    <p:sldId id="285" r:id="rId7"/>
-    <p:sldId id="266" r:id="rId8"/>
-    <p:sldId id="272" r:id="rId9"/>
-    <p:sldId id="268" r:id="rId10"/>
-    <p:sldId id="267" r:id="rId11"/>
-    <p:sldId id="269" r:id="rId12"/>
-    <p:sldId id="270" r:id="rId13"/>
-    <p:sldId id="271" r:id="rId14"/>
-    <p:sldId id="273" r:id="rId15"/>
-    <p:sldId id="274" r:id="rId16"/>
-    <p:sldId id="275" r:id="rId17"/>
-    <p:sldId id="276" r:id="rId18"/>
-    <p:sldId id="277" r:id="rId19"/>
-    <p:sldId id="278" r:id="rId20"/>
-    <p:sldId id="257" r:id="rId21"/>
-    <p:sldId id="258" r:id="rId22"/>
-    <p:sldId id="261" r:id="rId23"/>
-    <p:sldId id="279" r:id="rId24"/>
-    <p:sldId id="264" r:id="rId25"/>
-    <p:sldId id="280" r:id="rId26"/>
+    <p:sldId id="286" r:id="rId4"/>
+    <p:sldId id="287" r:id="rId5"/>
+    <p:sldId id="283" r:id="rId6"/>
+    <p:sldId id="284" r:id="rId7"/>
+    <p:sldId id="282" r:id="rId8"/>
+    <p:sldId id="285" r:id="rId9"/>
+    <p:sldId id="266" r:id="rId10"/>
+    <p:sldId id="272" r:id="rId11"/>
+    <p:sldId id="268" r:id="rId12"/>
+    <p:sldId id="267" r:id="rId13"/>
+    <p:sldId id="269" r:id="rId14"/>
+    <p:sldId id="270" r:id="rId15"/>
+    <p:sldId id="271" r:id="rId16"/>
+    <p:sldId id="273" r:id="rId17"/>
+    <p:sldId id="274" r:id="rId18"/>
+    <p:sldId id="275" r:id="rId19"/>
+    <p:sldId id="276" r:id="rId20"/>
+    <p:sldId id="277" r:id="rId21"/>
+    <p:sldId id="278" r:id="rId22"/>
+    <p:sldId id="257" r:id="rId23"/>
+    <p:sldId id="258" r:id="rId24"/>
+    <p:sldId id="261" r:id="rId25"/>
+    <p:sldId id="279" r:id="rId26"/>
+    <p:sldId id="264" r:id="rId27"/>
+    <p:sldId id="280" r:id="rId28"/>
   </p:sldIdLst>
   <p:sldSz cx="12192000" cy="6858000"/>
   <p:notesSz cx="6858000" cy="9144000"/>
@@ -221,7 +223,7 @@
           <a:p>
             <a:fld id="{C1EB6CE2-6DA4-48BF-BA87-13C2EE054022}" type="datetimeFigureOut">
               <a:rPr lang="ko-KR" altLang="en-US" smtClean="0"/>
-              <a:t>2021-11-06</a:t>
+              <a:t>2021-11-08</a:t>
             </a:fld>
             <a:endParaRPr lang="ko-KR" altLang="en-US"/>
           </a:p>
@@ -553,7 +555,91 @@
           <a:p>
             <a:fld id="{E6B83570-FA1E-4B84-ABDE-A90A0E5EDE68}" type="slidenum">
               <a:rPr lang="ko-KR" altLang="en-US" smtClean="0"/>
-              <a:t>11</a:t>
+              <a:t>4</a:t>
+            </a:fld>
+            <a:endParaRPr lang="ko-KR" altLang="en-US"/>
+          </a:p>
+        </p:txBody>
+      </p:sp>
+    </p:spTree>
+    <p:extLst>
+      <p:ext uri="{BB962C8B-B14F-4D97-AF65-F5344CB8AC3E}">
+        <p14:creationId xmlns:p14="http://schemas.microsoft.com/office/powerpoint/2010/main" val="3342024"/>
+      </p:ext>
+    </p:extLst>
+  </p:cSld>
+  <p:clrMapOvr>
+    <a:masterClrMapping/>
+  </p:clrMapOvr>
+</p:notes>
+</file>
+
+<file path=ppt/notesSlides/notesSlide2.xml><?xml version="1.0" encoding="utf-8"?>
+<p:notes xmlns:a="http://schemas.openxmlformats.org/drawingml/2006/main" xmlns:r="http://schemas.openxmlformats.org/officeDocument/2006/relationships" xmlns:p="http://schemas.openxmlformats.org/presentationml/2006/main">
+  <p:cSld>
+    <p:spTree>
+      <p:nvGrpSpPr>
+        <p:cNvPr id="1" name=""/>
+        <p:cNvGrpSpPr/>
+        <p:nvPr/>
+      </p:nvGrpSpPr>
+      <p:grpSpPr>
+        <a:xfrm>
+          <a:off x="0" y="0"/>
+          <a:ext cx="0" cy="0"/>
+          <a:chOff x="0" y="0"/>
+          <a:chExt cx="0" cy="0"/>
+        </a:xfrm>
+      </p:grpSpPr>
+      <p:sp>
+        <p:nvSpPr>
+          <p:cNvPr id="2" name="슬라이드 이미지 개체 틀 1"/>
+          <p:cNvSpPr>
+            <a:spLocks noGrp="1" noRot="1" noChangeAspect="1"/>
+          </p:cNvSpPr>
+          <p:nvPr>
+            <p:ph type="sldImg"/>
+          </p:nvPr>
+        </p:nvSpPr>
+        <p:spPr/>
+      </p:sp>
+      <p:sp>
+        <p:nvSpPr>
+          <p:cNvPr id="3" name="슬라이드 노트 개체 틀 2"/>
+          <p:cNvSpPr>
+            <a:spLocks noGrp="1"/>
+          </p:cNvSpPr>
+          <p:nvPr>
+            <p:ph type="body" idx="1"/>
+          </p:nvPr>
+        </p:nvSpPr>
+        <p:spPr/>
+        <p:txBody>
+          <a:bodyPr/>
+          <a:lstStyle/>
+          <a:p>
+            <a:endParaRPr lang="ko-KR" altLang="en-US" dirty="0"/>
+          </a:p>
+        </p:txBody>
+      </p:sp>
+      <p:sp>
+        <p:nvSpPr>
+          <p:cNvPr id="4" name="슬라이드 번호 개체 틀 3"/>
+          <p:cNvSpPr>
+            <a:spLocks noGrp="1"/>
+          </p:cNvSpPr>
+          <p:nvPr>
+            <p:ph type="sldNum" sz="quarter" idx="5"/>
+          </p:nvPr>
+        </p:nvSpPr>
+        <p:spPr/>
+        <p:txBody>
+          <a:bodyPr/>
+          <a:lstStyle/>
+          <a:p>
+            <a:fld id="{E6B83570-FA1E-4B84-ABDE-A90A0E5EDE68}" type="slidenum">
+              <a:rPr lang="ko-KR" altLang="en-US" smtClean="0"/>
+              <a:t>13</a:t>
             </a:fld>
             <a:endParaRPr lang="ko-KR" altLang="en-US"/>
           </a:p>
@@ -979,7 +1065,7 @@
           <a:p>
             <a:fld id="{F40A9666-11EA-419D-9400-8771FF940099}" type="datetimeFigureOut">
               <a:rPr lang="ko-KR" altLang="en-US" smtClean="0"/>
-              <a:t>2021-11-06</a:t>
+              <a:t>2021-11-08</a:t>
             </a:fld>
             <a:endParaRPr lang="ko-KR" altLang="en-US"/>
           </a:p>
@@ -1154,7 +1240,7 @@
           <a:p>
             <a:fld id="{F40A9666-11EA-419D-9400-8771FF940099}" type="datetimeFigureOut">
               <a:rPr lang="ko-KR" altLang="en-US" smtClean="0"/>
-              <a:t>2021-11-06</a:t>
+              <a:t>2021-11-08</a:t>
             </a:fld>
             <a:endParaRPr lang="ko-KR" altLang="en-US"/>
           </a:p>
@@ -1532,7 +1618,7 @@
           <a:p>
             <a:fld id="{F40A9666-11EA-419D-9400-8771FF940099}" type="datetimeFigureOut">
               <a:rPr lang="ko-KR" altLang="en-US" smtClean="0"/>
-              <a:t>2021-11-06</a:t>
+              <a:t>2021-11-08</a:t>
             </a:fld>
             <a:endParaRPr lang="ko-KR" altLang="en-US"/>
           </a:p>
@@ -1702,7 +1788,7 @@
           <a:p>
             <a:fld id="{F40A9666-11EA-419D-9400-8771FF940099}" type="datetimeFigureOut">
               <a:rPr lang="ko-KR" altLang="en-US" smtClean="0"/>
-              <a:t>2021-11-06</a:t>
+              <a:t>2021-11-08</a:t>
             </a:fld>
             <a:endParaRPr lang="ko-KR" altLang="en-US"/>
           </a:p>
@@ -1929,7 +2015,7 @@
           <a:p>
             <a:fld id="{F40A9666-11EA-419D-9400-8771FF940099}" type="datetimeFigureOut">
               <a:rPr lang="ko-KR" altLang="en-US" smtClean="0"/>
-              <a:t>2021-11-06</a:t>
+              <a:t>2021-11-08</a:t>
             </a:fld>
             <a:endParaRPr lang="ko-KR" altLang="en-US"/>
           </a:p>
@@ -2460,7 +2546,7 @@
           <a:p>
             <a:fld id="{F40A9666-11EA-419D-9400-8771FF940099}" type="datetimeFigureOut">
               <a:rPr lang="ko-KR" altLang="en-US" smtClean="0"/>
-              <a:t>2021-11-06</a:t>
+              <a:t>2021-11-08</a:t>
             </a:fld>
             <a:endParaRPr lang="ko-KR" altLang="en-US"/>
           </a:p>
@@ -2956,7 +3042,7 @@
           <a:p>
             <a:fld id="{F40A9666-11EA-419D-9400-8771FF940099}" type="datetimeFigureOut">
               <a:rPr lang="ko-KR" altLang="en-US" smtClean="0"/>
-              <a:t>2021-11-06</a:t>
+              <a:t>2021-11-08</a:t>
             </a:fld>
             <a:endParaRPr lang="ko-KR" altLang="en-US"/>
           </a:p>
@@ -3289,7 +3375,7 @@
           <a:p>
             <a:fld id="{F40A9666-11EA-419D-9400-8771FF940099}" type="datetimeFigureOut">
               <a:rPr lang="ko-KR" altLang="en-US" smtClean="0"/>
-              <a:t>2021-11-06</a:t>
+              <a:t>2021-11-08</a:t>
             </a:fld>
             <a:endParaRPr lang="ko-KR" altLang="en-US"/>
           </a:p>
@@ -3678,7 +3764,7 @@
           <a:p>
             <a:fld id="{F40A9666-11EA-419D-9400-8771FF940099}" type="datetimeFigureOut">
               <a:rPr lang="ko-KR" altLang="en-US" smtClean="0"/>
-              <a:t>2021-11-06</a:t>
+              <a:t>2021-11-08</a:t>
             </a:fld>
             <a:endParaRPr lang="ko-KR" altLang="en-US"/>
           </a:p>
@@ -3902,7 +3988,7 @@
           <a:p>
             <a:fld id="{F40A9666-11EA-419D-9400-8771FF940099}" type="datetimeFigureOut">
               <a:rPr lang="ko-KR" altLang="en-US" smtClean="0"/>
-              <a:t>2021-11-06</a:t>
+              <a:t>2021-11-08</a:t>
             </a:fld>
             <a:endParaRPr lang="ko-KR" altLang="en-US"/>
           </a:p>
@@ -4261,7 +4347,7 @@
           <a:p>
             <a:fld id="{F40A9666-11EA-419D-9400-8771FF940099}" type="datetimeFigureOut">
               <a:rPr lang="ko-KR" altLang="en-US" smtClean="0"/>
-              <a:t>2021-11-06</a:t>
+              <a:t>2021-11-08</a:t>
             </a:fld>
             <a:endParaRPr lang="ko-KR" altLang="en-US"/>
           </a:p>
@@ -4672,7 +4758,7 @@
           <a:p>
             <a:fld id="{F40A9666-11EA-419D-9400-8771FF940099}" type="datetimeFigureOut">
               <a:rPr lang="ko-KR" altLang="en-US" smtClean="0"/>
-              <a:t>2021-11-06</a:t>
+              <a:t>2021-11-08</a:t>
             </a:fld>
             <a:endParaRPr lang="ko-KR" altLang="en-US"/>
           </a:p>
@@ -5211,139 +5297,39 @@
           <a:chExt cx="0" cy="0"/>
         </a:xfrm>
       </p:grpSpPr>
-      <p:sp>
-        <p:nvSpPr>
-          <p:cNvPr id="2" name="제목 1">
-            <a:extLst>
-              <a:ext uri="{FF2B5EF4-FFF2-40B4-BE49-F238E27FC236}">
-                <a16:creationId xmlns:a16="http://schemas.microsoft.com/office/drawing/2014/main" id="{CC1B8BE5-D7E2-414D-88BC-823E447CCDFE}"/>
-              </a:ext>
-            </a:extLst>
-          </p:cNvPr>
-          <p:cNvSpPr>
-            <a:spLocks noGrp="1"/>
-          </p:cNvSpPr>
-          <p:nvPr>
-            <p:ph type="title"/>
-          </p:nvPr>
-        </p:nvSpPr>
-        <p:spPr/>
-        <p:txBody>
-          <a:bodyPr/>
-          <a:lstStyle/>
-          <a:p>
-            <a:r>
-              <a:rPr lang="en-US" altLang="ko-KR" dirty="0"/>
-              <a:t>Binary</a:t>
-            </a:r>
-            <a:r>
-              <a:rPr lang="ko-KR" altLang="en-US" dirty="0"/>
-              <a:t> </a:t>
-            </a:r>
-            <a:r>
-              <a:rPr lang="en-US" altLang="ko-KR" dirty="0"/>
-              <a:t>Search</a:t>
-            </a:r>
-            <a:endParaRPr lang="ko-KR" altLang="en-US" dirty="0"/>
-          </a:p>
-        </p:txBody>
-      </p:sp>
       <p:pic>
         <p:nvPicPr>
-          <p:cNvPr id="1026" name="Picture 2">
+          <p:cNvPr id="5" name="내용 개체 틀 4">
             <a:extLst>
               <a:ext uri="{FF2B5EF4-FFF2-40B4-BE49-F238E27FC236}">
-                <a16:creationId xmlns:a16="http://schemas.microsoft.com/office/drawing/2014/main" id="{66C31B54-1CDB-405A-AA07-2F625CD7E3A2}"/>
+                <a16:creationId xmlns:a16="http://schemas.microsoft.com/office/drawing/2014/main" id="{0B60445E-ABB8-4E60-B6F5-07F4183689C6}"/>
               </a:ext>
             </a:extLst>
           </p:cNvPr>
           <p:cNvPicPr>
-            <a:picLocks noGrp="1" noChangeAspect="1" noChangeArrowheads="1"/>
+            <a:picLocks noGrp="1" noChangeAspect="1"/>
           </p:cNvPicPr>
           <p:nvPr>
             <p:ph idx="1"/>
           </p:nvPr>
         </p:nvPicPr>
-        <p:blipFill rotWithShape="1">
-          <a:blip r:embed="rId2">
-            <a:extLst>
-              <a:ext uri="{28A0092B-C50C-407E-A947-70E740481C1C}">
-                <a14:useLocalDpi xmlns:a14="http://schemas.microsoft.com/office/drawing/2010/main" val="0"/>
-              </a:ext>
-            </a:extLst>
-          </a:blip>
-          <a:srcRect r="4491" b="46012"/>
-          <a:stretch/>
+        <p:blipFill>
+          <a:blip r:embed="rId2"/>
+          <a:stretch>
+            <a:fillRect/>
+          </a:stretch>
         </p:blipFill>
-        <p:spPr bwMode="auto">
-          <a:xfrm>
-            <a:off x="223666" y="1711960"/>
-            <a:ext cx="6872600" cy="4861559"/>
-          </a:xfrm>
-          <a:prstGeom prst="rect">
-            <a:avLst/>
-          </a:prstGeom>
-          <a:noFill/>
-          <a:extLst>
-            <a:ext uri="{909E8E84-426E-40DD-AFC4-6F175D3DCCD1}">
-              <a14:hiddenFill xmlns:a14="http://schemas.microsoft.com/office/drawing/2010/main">
-                <a:solidFill>
-                  <a:srgbClr val="FFFFFF"/>
-                </a:solidFill>
-              </a14:hiddenFill>
-            </a:ext>
-          </a:extLst>
-        </p:spPr>
-      </p:pic>
-      <p:pic>
-        <p:nvPicPr>
-          <p:cNvPr id="5" name="Picture 2">
-            <a:extLst>
-              <a:ext uri="{FF2B5EF4-FFF2-40B4-BE49-F238E27FC236}">
-                <a16:creationId xmlns:a16="http://schemas.microsoft.com/office/drawing/2014/main" id="{30EFA535-DD53-4973-80C2-C98392EF243C}"/>
-              </a:ext>
-            </a:extLst>
-          </p:cNvPr>
-          <p:cNvPicPr>
-            <a:picLocks noChangeAspect="1" noChangeArrowheads="1"/>
-          </p:cNvPicPr>
-          <p:nvPr/>
-        </p:nvPicPr>
-        <p:blipFill rotWithShape="1">
-          <a:blip r:embed="rId2">
-            <a:extLst>
-              <a:ext uri="{28A0092B-C50C-407E-A947-70E740481C1C}">
-                <a14:useLocalDpi xmlns:a14="http://schemas.microsoft.com/office/drawing/2010/main" val="0"/>
-              </a:ext>
-            </a:extLst>
-          </a:blip>
-          <a:srcRect t="53555" r="44725" b="10095"/>
-          <a:stretch/>
-        </p:blipFill>
-        <p:spPr bwMode="auto">
-          <a:xfrm>
-            <a:off x="5759814" y="3163614"/>
-            <a:ext cx="5360131" cy="4411036"/>
-          </a:xfrm>
-          <a:prstGeom prst="rect">
-            <a:avLst/>
-          </a:prstGeom>
-          <a:noFill/>
-          <a:extLst>
-            <a:ext uri="{909E8E84-426E-40DD-AFC4-6F175D3DCCD1}">
-              <a14:hiddenFill xmlns:a14="http://schemas.microsoft.com/office/drawing/2010/main">
-                <a:solidFill>
-                  <a:srgbClr val="FFFFFF"/>
-                </a:solidFill>
-              </a14:hiddenFill>
-            </a:ext>
-          </a:extLst>
+        <p:spPr>
+          <a:xfrm>
+            <a:off x="1324029" y="51547"/>
+            <a:ext cx="9079593" cy="6754905"/>
+          </a:xfrm>
         </p:spPr>
       </p:pic>
     </p:spTree>
     <p:extLst>
       <p:ext uri="{BB962C8B-B14F-4D97-AF65-F5344CB8AC3E}">
-        <p14:creationId xmlns:p14="http://schemas.microsoft.com/office/powerpoint/2010/main" val="3663463024"/>
+        <p14:creationId xmlns:p14="http://schemas.microsoft.com/office/powerpoint/2010/main" val="498435747"/>
       </p:ext>
     </p:extLst>
   </p:cSld>
@@ -5375,7 +5361,7 @@
           <p:cNvPr id="2" name="제목 1">
             <a:extLst>
               <a:ext uri="{FF2B5EF4-FFF2-40B4-BE49-F238E27FC236}">
-                <a16:creationId xmlns:a16="http://schemas.microsoft.com/office/drawing/2014/main" id="{A4365B1C-0C56-43B8-8148-BB73A95ABC50}"/>
+                <a16:creationId xmlns:a16="http://schemas.microsoft.com/office/drawing/2014/main" id="{CC1B8BE5-D7E2-414D-88BC-823E447CCDFE}"/>
               </a:ext>
             </a:extLst>
           </p:cNvPr>
@@ -5391,61 +5377,143 @@
           <a:bodyPr/>
           <a:lstStyle/>
           <a:p>
-            <a:endParaRPr lang="ko-KR" altLang="en-US"/>
-          </a:p>
-        </p:txBody>
-      </p:sp>
-      <p:pic>
-        <p:nvPicPr>
-          <p:cNvPr id="2050" name="Picture 2">
+            <a:r>
+              <a:rPr lang="en-US" altLang="ko-KR" dirty="0"/>
+              <a:t>Binary</a:t>
+            </a:r>
+            <a:r>
+              <a:rPr lang="ko-KR" altLang="en-US" dirty="0"/>
+              <a:t> </a:t>
+            </a:r>
+            <a:r>
+              <a:rPr lang="en-US" altLang="ko-KR" dirty="0"/>
+              <a:t>Search</a:t>
+            </a:r>
+            <a:endParaRPr lang="ko-KR" altLang="en-US" dirty="0"/>
+          </a:p>
+        </p:txBody>
+      </p:sp>
+      <p:sp>
+        <p:nvSpPr>
+          <p:cNvPr id="3" name="내용 개체 틀 2">
             <a:extLst>
               <a:ext uri="{FF2B5EF4-FFF2-40B4-BE49-F238E27FC236}">
-                <a16:creationId xmlns:a16="http://schemas.microsoft.com/office/drawing/2014/main" id="{FBCACA6F-0C2B-4AD5-95C6-B805E60033EC}"/>
+                <a16:creationId xmlns:a16="http://schemas.microsoft.com/office/drawing/2014/main" id="{3DA6938B-2493-4684-8900-725AEF88B883}"/>
               </a:ext>
             </a:extLst>
           </p:cNvPr>
-          <p:cNvPicPr>
-            <a:picLocks noGrp="1" noChangeAspect="1" noChangeArrowheads="1"/>
-          </p:cNvPicPr>
+          <p:cNvSpPr>
+            <a:spLocks noGrp="1"/>
+          </p:cNvSpPr>
           <p:nvPr>
             <p:ph idx="1"/>
           </p:nvPr>
-        </p:nvPicPr>
-        <p:blipFill rotWithShape="1">
-          <a:blip r:embed="rId3">
-            <a:extLst>
-              <a:ext uri="{28A0092B-C50C-407E-A947-70E740481C1C}">
-                <a14:useLocalDpi xmlns:a14="http://schemas.microsoft.com/office/drawing/2010/main" val="0"/>
-              </a:ext>
-            </a:extLst>
-          </a:blip>
-          <a:srcRect l="51763" t="12696" r="2252" b="42330"/>
-          <a:stretch/>
-        </p:blipFill>
-        <p:spPr bwMode="auto">
-          <a:xfrm>
-            <a:off x="865867" y="0"/>
-            <a:ext cx="10460266" cy="6821539"/>
-          </a:xfrm>
-          <a:prstGeom prst="rect">
-            <a:avLst/>
-          </a:prstGeom>
-          <a:noFill/>
-          <a:extLst>
-            <a:ext uri="{909E8E84-426E-40DD-AFC4-6F175D3DCCD1}">
-              <a14:hiddenFill xmlns:a14="http://schemas.microsoft.com/office/drawing/2010/main">
-                <a:solidFill>
-                  <a:srgbClr val="FFFFFF"/>
-                </a:solidFill>
-              </a14:hiddenFill>
-            </a:ext>
-          </a:extLst>
-        </p:spPr>
-      </p:pic>
+        </p:nvSpPr>
+        <p:spPr/>
+        <p:txBody>
+          <a:bodyPr/>
+          <a:lstStyle/>
+          <a:p>
+            <a:r>
+              <a:rPr lang="en-US" altLang="ko-KR" dirty="0" err="1"/>
+              <a:t>binarySearch</a:t>
+            </a:r>
+            <a:r>
+              <a:rPr lang="en-US" altLang="ko-KR" dirty="0"/>
+              <a:t>(</a:t>
+            </a:r>
+            <a:r>
+              <a:rPr lang="ko-KR" altLang="en-US" dirty="0"/>
+              <a:t> </a:t>
+            </a:r>
+            <a:r>
+              <a:rPr lang="en-US" altLang="ko-KR" dirty="0"/>
+              <a:t>A[],</a:t>
+            </a:r>
+            <a:r>
+              <a:rPr lang="ko-KR" altLang="en-US" dirty="0"/>
+              <a:t> </a:t>
+            </a:r>
+            <a:r>
+              <a:rPr lang="en-US" altLang="ko-KR" dirty="0"/>
+              <a:t>x</a:t>
+            </a:r>
+            <a:r>
+              <a:rPr lang="ko-KR" altLang="en-US" dirty="0"/>
+              <a:t> </a:t>
+            </a:r>
+            <a:r>
+              <a:rPr lang="en-US" altLang="ko-KR" dirty="0"/>
+              <a:t>)</a:t>
+            </a:r>
+          </a:p>
+          <a:p>
+            <a:r>
+              <a:rPr lang="en-US" altLang="ko-KR" dirty="0">
+                <a:sym typeface="Wingdings" panose="05000000000000000000" pitchFamily="2" charset="2"/>
+              </a:rPr>
+              <a:t> A[i-1] &lt; x &lt;= A[</a:t>
+            </a:r>
+            <a:r>
+              <a:rPr lang="en-US" altLang="ko-KR" dirty="0" err="1">
+                <a:sym typeface="Wingdings" panose="05000000000000000000" pitchFamily="2" charset="2"/>
+              </a:rPr>
+              <a:t>i</a:t>
+            </a:r>
+            <a:r>
+              <a:rPr lang="en-US" altLang="ko-KR" dirty="0">
+                <a:sym typeface="Wingdings" panose="05000000000000000000" pitchFamily="2" charset="2"/>
+              </a:rPr>
+              <a:t>] </a:t>
+            </a:r>
+            <a:r>
+              <a:rPr lang="ko-KR" altLang="en-US" dirty="0">
+                <a:sym typeface="Wingdings" panose="05000000000000000000" pitchFamily="2" charset="2"/>
+              </a:rPr>
+              <a:t>인 </a:t>
+            </a:r>
+            <a:r>
+              <a:rPr lang="en-US" altLang="ko-KR" dirty="0">
+                <a:sym typeface="Wingdings" panose="05000000000000000000" pitchFamily="2" charset="2"/>
+              </a:rPr>
+              <a:t> </a:t>
+            </a:r>
+            <a:r>
+              <a:rPr lang="en-US" altLang="ko-KR" dirty="0" err="1">
+                <a:sym typeface="Wingdings" panose="05000000000000000000" pitchFamily="2" charset="2"/>
+              </a:rPr>
+              <a:t>i</a:t>
+            </a:r>
+            <a:r>
+              <a:rPr lang="ko-KR" altLang="en-US" dirty="0" err="1">
+                <a:sym typeface="Wingdings" panose="05000000000000000000" pitchFamily="2" charset="2"/>
+              </a:rPr>
+              <a:t>를</a:t>
+            </a:r>
+            <a:r>
+              <a:rPr lang="ko-KR" altLang="en-US" dirty="0">
+                <a:sym typeface="Wingdings" panose="05000000000000000000" pitchFamily="2" charset="2"/>
+              </a:rPr>
+              <a:t> 반환하는 것</a:t>
+            </a:r>
+            <a:endParaRPr lang="en-US" altLang="ko-KR" dirty="0">
+              <a:sym typeface="Wingdings" panose="05000000000000000000" pitchFamily="2" charset="2"/>
+            </a:endParaRPr>
+          </a:p>
+          <a:p>
+            <a:pPr marL="0" indent="0">
+              <a:buNone/>
+            </a:pPr>
+            <a:endParaRPr lang="en-US" altLang="ko-KR" dirty="0">
+              <a:sym typeface="Wingdings" panose="05000000000000000000" pitchFamily="2" charset="2"/>
+            </a:endParaRPr>
+          </a:p>
+        </p:txBody>
+      </p:sp>
     </p:spTree>
     <p:extLst>
       <p:ext uri="{BB962C8B-B14F-4D97-AF65-F5344CB8AC3E}">
-        <p14:creationId xmlns:p14="http://schemas.microsoft.com/office/powerpoint/2010/main" val="3408721957"/>
+        <p14:creationId xmlns:p14="http://schemas.microsoft.com/office/powerpoint/2010/main" val="1744329047"/>
       </p:ext>
     </p:extLst>
   </p:cSld>
@@ -5477,7 +5545,7 @@
           <p:cNvPr id="2" name="제목 1">
             <a:extLst>
               <a:ext uri="{FF2B5EF4-FFF2-40B4-BE49-F238E27FC236}">
-                <a16:creationId xmlns:a16="http://schemas.microsoft.com/office/drawing/2014/main" id="{6F40DDD6-9155-4F1E-B556-5866406BF727}"/>
+                <a16:creationId xmlns:a16="http://schemas.microsoft.com/office/drawing/2014/main" id="{CC1B8BE5-D7E2-414D-88BC-823E447CCDFE}"/>
               </a:ext>
             </a:extLst>
           </p:cNvPr>
@@ -5493,23 +5561,37 @@
           <a:bodyPr/>
           <a:lstStyle/>
           <a:p>
-            <a:endParaRPr lang="ko-KR" altLang="en-US"/>
+            <a:r>
+              <a:rPr lang="en-US" altLang="ko-KR" dirty="0"/>
+              <a:t>Binary</a:t>
+            </a:r>
+            <a:r>
+              <a:rPr lang="ko-KR" altLang="en-US" dirty="0"/>
+              <a:t> </a:t>
+            </a:r>
+            <a:r>
+              <a:rPr lang="en-US" altLang="ko-KR" dirty="0"/>
+              <a:t>Search</a:t>
+            </a:r>
+            <a:endParaRPr lang="ko-KR" altLang="en-US" dirty="0"/>
           </a:p>
         </p:txBody>
       </p:sp>
       <p:pic>
         <p:nvPicPr>
-          <p:cNvPr id="5" name="Picture 2">
+          <p:cNvPr id="1026" name="Picture 2">
             <a:extLst>
               <a:ext uri="{FF2B5EF4-FFF2-40B4-BE49-F238E27FC236}">
-                <a16:creationId xmlns:a16="http://schemas.microsoft.com/office/drawing/2014/main" id="{2FCDF05E-AE1A-4862-8921-1707335EC76F}"/>
+                <a16:creationId xmlns:a16="http://schemas.microsoft.com/office/drawing/2014/main" id="{66C31B54-1CDB-405A-AA07-2F625CD7E3A2}"/>
               </a:ext>
             </a:extLst>
           </p:cNvPr>
           <p:cNvPicPr>
-            <a:picLocks noChangeAspect="1" noChangeArrowheads="1"/>
+            <a:picLocks noGrp="1" noChangeAspect="1" noChangeArrowheads="1"/>
           </p:cNvPicPr>
-          <p:nvPr/>
+          <p:nvPr>
+            <p:ph idx="1"/>
+          </p:nvPr>
         </p:nvPicPr>
         <p:blipFill rotWithShape="1">
           <a:blip r:embed="rId2">
@@ -5519,13 +5601,13 @@
               </a:ext>
             </a:extLst>
           </a:blip>
-          <a:srcRect l="51763" t="12696" r="2252" b="42330"/>
+          <a:srcRect r="4491" b="46012"/>
           <a:stretch/>
         </p:blipFill>
         <p:spPr bwMode="auto">
           <a:xfrm>
-            <a:off x="0" y="-39383"/>
-            <a:ext cx="8192900" cy="5342903"/>
+            <a:off x="223666" y="1711960"/>
+            <a:ext cx="6872600" cy="4861559"/>
           </a:xfrm>
           <a:prstGeom prst="rect">
             <a:avLst/>
@@ -5544,19 +5626,17 @@
       </p:pic>
       <p:pic>
         <p:nvPicPr>
-          <p:cNvPr id="4098" name="Picture 2">
+          <p:cNvPr id="5" name="Picture 2">
             <a:extLst>
               <a:ext uri="{FF2B5EF4-FFF2-40B4-BE49-F238E27FC236}">
-                <a16:creationId xmlns:a16="http://schemas.microsoft.com/office/drawing/2014/main" id="{DF0605FF-1D98-43FF-B250-6BFB3EA37292}"/>
+                <a16:creationId xmlns:a16="http://schemas.microsoft.com/office/drawing/2014/main" id="{30EFA535-DD53-4973-80C2-C98392EF243C}"/>
               </a:ext>
             </a:extLst>
           </p:cNvPr>
           <p:cNvPicPr>
-            <a:picLocks noGrp="1" noChangeAspect="1" noChangeArrowheads="1"/>
+            <a:picLocks noChangeAspect="1" noChangeArrowheads="1"/>
           </p:cNvPicPr>
-          <p:nvPr>
-            <p:ph idx="1"/>
-          </p:nvPr>
+          <p:nvPr/>
         </p:nvPicPr>
         <p:blipFill rotWithShape="1">
           <a:blip r:embed="rId2">
@@ -5566,13 +5646,13 @@
               </a:ext>
             </a:extLst>
           </a:blip>
-          <a:srcRect l="46434" t="58728" r="27557" b="19523"/>
+          <a:srcRect t="53555" r="44725" b="10095"/>
           <a:stretch/>
         </p:blipFill>
         <p:spPr bwMode="auto">
           <a:xfrm>
-            <a:off x="6858599" y="3881717"/>
-            <a:ext cx="5620869" cy="3134062"/>
+            <a:off x="5759814" y="3163614"/>
+            <a:ext cx="5360131" cy="4411036"/>
           </a:xfrm>
           <a:prstGeom prst="rect">
             <a:avLst/>
@@ -5592,7 +5672,7 @@
     </p:spTree>
     <p:extLst>
       <p:ext uri="{BB962C8B-B14F-4D97-AF65-F5344CB8AC3E}">
-        <p14:creationId xmlns:p14="http://schemas.microsoft.com/office/powerpoint/2010/main" val="1014951458"/>
+        <p14:creationId xmlns:p14="http://schemas.microsoft.com/office/powerpoint/2010/main" val="3663463024"/>
       </p:ext>
     </p:extLst>
   </p:cSld>
@@ -5624,7 +5704,7 @@
           <p:cNvPr id="2" name="제목 1">
             <a:extLst>
               <a:ext uri="{FF2B5EF4-FFF2-40B4-BE49-F238E27FC236}">
-                <a16:creationId xmlns:a16="http://schemas.microsoft.com/office/drawing/2014/main" id="{6F40DDD6-9155-4F1E-B556-5866406BF727}"/>
+                <a16:creationId xmlns:a16="http://schemas.microsoft.com/office/drawing/2014/main" id="{A4365B1C-0C56-43B8-8148-BB73A95ABC50}"/>
               </a:ext>
             </a:extLst>
           </p:cNvPr>
@@ -5646,33 +5726,35 @@
       </p:sp>
       <p:pic>
         <p:nvPicPr>
-          <p:cNvPr id="4" name="Picture 2">
+          <p:cNvPr id="2050" name="Picture 2">
             <a:extLst>
               <a:ext uri="{FF2B5EF4-FFF2-40B4-BE49-F238E27FC236}">
-                <a16:creationId xmlns:a16="http://schemas.microsoft.com/office/drawing/2014/main" id="{B6EF0A89-3F46-45C0-A32B-775C5364AC53}"/>
+                <a16:creationId xmlns:a16="http://schemas.microsoft.com/office/drawing/2014/main" id="{FBCACA6F-0C2B-4AD5-95C6-B805E60033EC}"/>
               </a:ext>
             </a:extLst>
           </p:cNvPr>
           <p:cNvPicPr>
-            <a:picLocks noChangeAspect="1" noChangeArrowheads="1"/>
+            <a:picLocks noGrp="1" noChangeAspect="1" noChangeArrowheads="1"/>
           </p:cNvPicPr>
-          <p:nvPr/>
+          <p:nvPr>
+            <p:ph idx="1"/>
+          </p:nvPr>
         </p:nvPicPr>
         <p:blipFill rotWithShape="1">
-          <a:blip r:embed="rId2">
+          <a:blip r:embed="rId3">
             <a:extLst>
               <a:ext uri="{28A0092B-C50C-407E-A947-70E740481C1C}">
                 <a14:useLocalDpi xmlns:a14="http://schemas.microsoft.com/office/drawing/2010/main" val="0"/>
               </a:ext>
             </a:extLst>
           </a:blip>
-          <a:srcRect l="46434" t="58728" r="27557" b="19523"/>
+          <a:srcRect l="51763" t="12696" r="2252" b="42330"/>
           <a:stretch/>
         </p:blipFill>
         <p:spPr bwMode="auto">
           <a:xfrm>
-            <a:off x="239184" y="539496"/>
-            <a:ext cx="5620869" cy="3134062"/>
+            <a:off x="865867" y="0"/>
+            <a:ext cx="10460266" cy="6821539"/>
           </a:xfrm>
           <a:prstGeom prst="rect">
             <a:avLst/>
@@ -5689,57 +5771,10 @@
           </a:extLst>
         </p:spPr>
       </p:pic>
-      <p:pic>
-        <p:nvPicPr>
-          <p:cNvPr id="4098" name="Picture 2">
-            <a:extLst>
-              <a:ext uri="{FF2B5EF4-FFF2-40B4-BE49-F238E27FC236}">
-                <a16:creationId xmlns:a16="http://schemas.microsoft.com/office/drawing/2014/main" id="{DF0605FF-1D98-43FF-B250-6BFB3EA37292}"/>
-              </a:ext>
-            </a:extLst>
-          </p:cNvPr>
-          <p:cNvPicPr>
-            <a:picLocks noGrp="1" noChangeAspect="1" noChangeArrowheads="1"/>
-          </p:cNvPicPr>
-          <p:nvPr>
-            <p:ph idx="1"/>
-          </p:nvPr>
-        </p:nvPicPr>
-        <p:blipFill rotWithShape="1">
-          <a:blip r:embed="rId2">
-            <a:extLst>
-              <a:ext uri="{28A0092B-C50C-407E-A947-70E740481C1C}">
-                <a14:useLocalDpi xmlns:a14="http://schemas.microsoft.com/office/drawing/2010/main" val="0"/>
-              </a:ext>
-            </a:extLst>
-          </a:blip>
-          <a:srcRect l="72733" t="58728" r="-57" b="19398"/>
-          <a:stretch/>
-        </p:blipFill>
-        <p:spPr bwMode="auto">
-          <a:xfrm>
-            <a:off x="3800522" y="2312295"/>
-            <a:ext cx="8152294" cy="4351649"/>
-          </a:xfrm>
-          <a:prstGeom prst="rect">
-            <a:avLst/>
-          </a:prstGeom>
-          <a:noFill/>
-          <a:extLst>
-            <a:ext uri="{909E8E84-426E-40DD-AFC4-6F175D3DCCD1}">
-              <a14:hiddenFill xmlns:a14="http://schemas.microsoft.com/office/drawing/2010/main">
-                <a:solidFill>
-                  <a:srgbClr val="FFFFFF"/>
-                </a:solidFill>
-              </a14:hiddenFill>
-            </a:ext>
-          </a:extLst>
-        </p:spPr>
-      </p:pic>
     </p:spTree>
     <p:extLst>
       <p:ext uri="{BB962C8B-B14F-4D97-AF65-F5344CB8AC3E}">
-        <p14:creationId xmlns:p14="http://schemas.microsoft.com/office/powerpoint/2010/main" val="224524592"/>
+        <p14:creationId xmlns:p14="http://schemas.microsoft.com/office/powerpoint/2010/main" val="3408721957"/>
       </p:ext>
     </p:extLst>
   </p:cSld>
@@ -5771,7 +5806,7 @@
           <p:cNvPr id="2" name="제목 1">
             <a:extLst>
               <a:ext uri="{FF2B5EF4-FFF2-40B4-BE49-F238E27FC236}">
-                <a16:creationId xmlns:a16="http://schemas.microsoft.com/office/drawing/2014/main" id="{23533C7F-DBB7-4E13-A004-0751FEDBF5E5}"/>
+                <a16:creationId xmlns:a16="http://schemas.microsoft.com/office/drawing/2014/main" id="{6F40DDD6-9155-4F1E-B556-5866406BF727}"/>
               </a:ext>
             </a:extLst>
           </p:cNvPr>
@@ -5787,54 +5822,106 @@
           <a:bodyPr/>
           <a:lstStyle/>
           <a:p>
-            <a:r>
-              <a:rPr lang="ko-KR" altLang="en-US" dirty="0"/>
-              <a:t>읽어보면 좋은 </a:t>
-            </a:r>
-            <a:r>
-              <a:rPr lang="en-US" altLang="ko-KR" dirty="0"/>
-              <a:t>Binary Search </a:t>
-            </a:r>
-            <a:r>
-              <a:rPr lang="ko-KR" altLang="en-US" dirty="0"/>
-              <a:t>글</a:t>
-            </a:r>
-          </a:p>
-        </p:txBody>
-      </p:sp>
-      <p:sp>
-        <p:nvSpPr>
-          <p:cNvPr id="3" name="내용 개체 틀 2">
+            <a:endParaRPr lang="ko-KR" altLang="en-US"/>
+          </a:p>
+        </p:txBody>
+      </p:sp>
+      <p:pic>
+        <p:nvPicPr>
+          <p:cNvPr id="5" name="Picture 2">
             <a:extLst>
               <a:ext uri="{FF2B5EF4-FFF2-40B4-BE49-F238E27FC236}">
-                <a16:creationId xmlns:a16="http://schemas.microsoft.com/office/drawing/2014/main" id="{B6AEDDE2-0C12-4805-A893-C00C943A7F7F}"/>
+                <a16:creationId xmlns:a16="http://schemas.microsoft.com/office/drawing/2014/main" id="{2FCDF05E-AE1A-4862-8921-1707335EC76F}"/>
               </a:ext>
             </a:extLst>
           </p:cNvPr>
-          <p:cNvSpPr>
-            <a:spLocks noGrp="1"/>
-          </p:cNvSpPr>
+          <p:cNvPicPr>
+            <a:picLocks noChangeAspect="1" noChangeArrowheads="1"/>
+          </p:cNvPicPr>
+          <p:nvPr/>
+        </p:nvPicPr>
+        <p:blipFill rotWithShape="1">
+          <a:blip r:embed="rId2">
+            <a:extLst>
+              <a:ext uri="{28A0092B-C50C-407E-A947-70E740481C1C}">
+                <a14:useLocalDpi xmlns:a14="http://schemas.microsoft.com/office/drawing/2010/main" val="0"/>
+              </a:ext>
+            </a:extLst>
+          </a:blip>
+          <a:srcRect l="51763" t="12696" r="2252" b="42330"/>
+          <a:stretch/>
+        </p:blipFill>
+        <p:spPr bwMode="auto">
+          <a:xfrm>
+            <a:off x="0" y="-39383"/>
+            <a:ext cx="8192900" cy="5342903"/>
+          </a:xfrm>
+          <a:prstGeom prst="rect">
+            <a:avLst/>
+          </a:prstGeom>
+          <a:noFill/>
+          <a:extLst>
+            <a:ext uri="{909E8E84-426E-40DD-AFC4-6F175D3DCCD1}">
+              <a14:hiddenFill xmlns:a14="http://schemas.microsoft.com/office/drawing/2010/main">
+                <a:solidFill>
+                  <a:srgbClr val="FFFFFF"/>
+                </a:solidFill>
+              </a14:hiddenFill>
+            </a:ext>
+          </a:extLst>
+        </p:spPr>
+      </p:pic>
+      <p:pic>
+        <p:nvPicPr>
+          <p:cNvPr id="4098" name="Picture 2">
+            <a:extLst>
+              <a:ext uri="{FF2B5EF4-FFF2-40B4-BE49-F238E27FC236}">
+                <a16:creationId xmlns:a16="http://schemas.microsoft.com/office/drawing/2014/main" id="{DF0605FF-1D98-43FF-B250-6BFB3EA37292}"/>
+              </a:ext>
+            </a:extLst>
+          </p:cNvPr>
+          <p:cNvPicPr>
+            <a:picLocks noGrp="1" noChangeAspect="1" noChangeArrowheads="1"/>
+          </p:cNvPicPr>
           <p:nvPr>
             <p:ph idx="1"/>
           </p:nvPr>
-        </p:nvSpPr>
-        <p:spPr/>
-        <p:txBody>
-          <a:bodyPr/>
-          <a:lstStyle/>
-          <a:p>
-            <a:r>
-              <a:rPr lang="en-US" altLang="ko-KR" dirty="0"/>
-              <a:t>https://www.acmicpc.net/blog/view/109</a:t>
-            </a:r>
-            <a:endParaRPr lang="ko-KR" altLang="en-US" dirty="0"/>
-          </a:p>
-        </p:txBody>
-      </p:sp>
+        </p:nvPicPr>
+        <p:blipFill rotWithShape="1">
+          <a:blip r:embed="rId2">
+            <a:extLst>
+              <a:ext uri="{28A0092B-C50C-407E-A947-70E740481C1C}">
+                <a14:useLocalDpi xmlns:a14="http://schemas.microsoft.com/office/drawing/2010/main" val="0"/>
+              </a:ext>
+            </a:extLst>
+          </a:blip>
+          <a:srcRect l="46434" t="58728" r="27557" b="19523"/>
+          <a:stretch/>
+        </p:blipFill>
+        <p:spPr bwMode="auto">
+          <a:xfrm>
+            <a:off x="6858599" y="3881717"/>
+            <a:ext cx="5620869" cy="3134062"/>
+          </a:xfrm>
+          <a:prstGeom prst="rect">
+            <a:avLst/>
+          </a:prstGeom>
+          <a:noFill/>
+          <a:extLst>
+            <a:ext uri="{909E8E84-426E-40DD-AFC4-6F175D3DCCD1}">
+              <a14:hiddenFill xmlns:a14="http://schemas.microsoft.com/office/drawing/2010/main">
+                <a:solidFill>
+                  <a:srgbClr val="FFFFFF"/>
+                </a:solidFill>
+              </a14:hiddenFill>
+            </a:ext>
+          </a:extLst>
+        </p:spPr>
+      </p:pic>
     </p:spTree>
     <p:extLst>
       <p:ext uri="{BB962C8B-B14F-4D97-AF65-F5344CB8AC3E}">
-        <p14:creationId xmlns:p14="http://schemas.microsoft.com/office/powerpoint/2010/main" val="941012524"/>
+        <p14:creationId xmlns:p14="http://schemas.microsoft.com/office/powerpoint/2010/main" val="1014951458"/>
       </p:ext>
     </p:extLst>
   </p:cSld>
@@ -5861,67 +5948,60 @@
           <a:chExt cx="0" cy="0"/>
         </a:xfrm>
       </p:grpSpPr>
+      <p:sp>
+        <p:nvSpPr>
+          <p:cNvPr id="2" name="제목 1">
+            <a:extLst>
+              <a:ext uri="{FF2B5EF4-FFF2-40B4-BE49-F238E27FC236}">
+                <a16:creationId xmlns:a16="http://schemas.microsoft.com/office/drawing/2014/main" id="{6F40DDD6-9155-4F1E-B556-5866406BF727}"/>
+              </a:ext>
+            </a:extLst>
+          </p:cNvPr>
+          <p:cNvSpPr>
+            <a:spLocks noGrp="1"/>
+          </p:cNvSpPr>
+          <p:nvPr>
+            <p:ph type="title"/>
+          </p:nvPr>
+        </p:nvSpPr>
+        <p:spPr/>
+        <p:txBody>
+          <a:bodyPr/>
+          <a:lstStyle/>
+          <a:p>
+            <a:endParaRPr lang="ko-KR" altLang="en-US"/>
+          </a:p>
+        </p:txBody>
+      </p:sp>
       <p:pic>
         <p:nvPicPr>
-          <p:cNvPr id="5" name="그림 4">
+          <p:cNvPr id="4" name="Picture 2">
             <a:extLst>
               <a:ext uri="{FF2B5EF4-FFF2-40B4-BE49-F238E27FC236}">
-                <a16:creationId xmlns:a16="http://schemas.microsoft.com/office/drawing/2014/main" id="{2147CEE7-E493-49C1-A6BD-A9F0BE91E7BC}"/>
+                <a16:creationId xmlns:a16="http://schemas.microsoft.com/office/drawing/2014/main" id="{B6EF0A89-3F46-45C0-A32B-775C5364AC53}"/>
               </a:ext>
             </a:extLst>
           </p:cNvPr>
           <p:cNvPicPr>
-            <a:picLocks noChangeAspect="1"/>
+            <a:picLocks noChangeAspect="1" noChangeArrowheads="1"/>
           </p:cNvPicPr>
           <p:nvPr/>
         </p:nvPicPr>
-        <p:blipFill>
-          <a:blip r:embed="rId2"/>
-          <a:stretch>
-            <a:fillRect/>
-          </a:stretch>
-        </p:blipFill>
-        <p:spPr>
-          <a:xfrm>
-            <a:off x="463617" y="209100"/>
-            <a:ext cx="8135485" cy="6439799"/>
-          </a:xfrm>
-          <a:prstGeom prst="rect">
-            <a:avLst/>
-          </a:prstGeom>
-        </p:spPr>
-      </p:pic>
-      <p:pic>
-        <p:nvPicPr>
-          <p:cNvPr id="9" name="Picture 2">
-            <a:extLst>
-              <a:ext uri="{FF2B5EF4-FFF2-40B4-BE49-F238E27FC236}">
-                <a16:creationId xmlns:a16="http://schemas.microsoft.com/office/drawing/2014/main" id="{C8D943E2-32E6-4714-9C74-B5C4757B7570}"/>
-              </a:ext>
-            </a:extLst>
-          </p:cNvPr>
-          <p:cNvPicPr>
-            <a:picLocks noGrp="1" noChangeAspect="1" noChangeArrowheads="1"/>
-          </p:cNvPicPr>
-          <p:nvPr>
-            <p:ph idx="1"/>
-          </p:nvPr>
-        </p:nvPicPr>
         <p:blipFill rotWithShape="1">
-          <a:blip r:embed="rId3">
+          <a:blip r:embed="rId2">
             <a:extLst>
               <a:ext uri="{28A0092B-C50C-407E-A947-70E740481C1C}">
                 <a14:useLocalDpi xmlns:a14="http://schemas.microsoft.com/office/drawing/2010/main" val="0"/>
               </a:ext>
             </a:extLst>
           </a:blip>
-          <a:srcRect l="86624" t="62171" r="163" b="31037"/>
+          <a:srcRect l="46434" t="58728" r="27557" b="19523"/>
           <a:stretch/>
         </p:blipFill>
         <p:spPr bwMode="auto">
           <a:xfrm>
-            <a:off x="8469936" y="2363777"/>
-            <a:ext cx="3942080" cy="1351280"/>
+            <a:off x="239184" y="539496"/>
+            <a:ext cx="5620869" cy="3134062"/>
           </a:xfrm>
           <a:prstGeom prst="rect">
             <a:avLst/>
@@ -5938,10 +6018,57 @@
           </a:extLst>
         </p:spPr>
       </p:pic>
+      <p:pic>
+        <p:nvPicPr>
+          <p:cNvPr id="4098" name="Picture 2">
+            <a:extLst>
+              <a:ext uri="{FF2B5EF4-FFF2-40B4-BE49-F238E27FC236}">
+                <a16:creationId xmlns:a16="http://schemas.microsoft.com/office/drawing/2014/main" id="{DF0605FF-1D98-43FF-B250-6BFB3EA37292}"/>
+              </a:ext>
+            </a:extLst>
+          </p:cNvPr>
+          <p:cNvPicPr>
+            <a:picLocks noGrp="1" noChangeAspect="1" noChangeArrowheads="1"/>
+          </p:cNvPicPr>
+          <p:nvPr>
+            <p:ph idx="1"/>
+          </p:nvPr>
+        </p:nvPicPr>
+        <p:blipFill rotWithShape="1">
+          <a:blip r:embed="rId2">
+            <a:extLst>
+              <a:ext uri="{28A0092B-C50C-407E-A947-70E740481C1C}">
+                <a14:useLocalDpi xmlns:a14="http://schemas.microsoft.com/office/drawing/2010/main" val="0"/>
+              </a:ext>
+            </a:extLst>
+          </a:blip>
+          <a:srcRect l="72733" t="58728" r="-57" b="19398"/>
+          <a:stretch/>
+        </p:blipFill>
+        <p:spPr bwMode="auto">
+          <a:xfrm>
+            <a:off x="3800522" y="2312295"/>
+            <a:ext cx="8152294" cy="4351649"/>
+          </a:xfrm>
+          <a:prstGeom prst="rect">
+            <a:avLst/>
+          </a:prstGeom>
+          <a:noFill/>
+          <a:extLst>
+            <a:ext uri="{909E8E84-426E-40DD-AFC4-6F175D3DCCD1}">
+              <a14:hiddenFill xmlns:a14="http://schemas.microsoft.com/office/drawing/2010/main">
+                <a:solidFill>
+                  <a:srgbClr val="FFFFFF"/>
+                </a:solidFill>
+              </a14:hiddenFill>
+            </a:ext>
+          </a:extLst>
+        </p:spPr>
+      </p:pic>
     </p:spTree>
     <p:extLst>
       <p:ext uri="{BB962C8B-B14F-4D97-AF65-F5344CB8AC3E}">
-        <p14:creationId xmlns:p14="http://schemas.microsoft.com/office/powerpoint/2010/main" val="3169485616"/>
+        <p14:creationId xmlns:p14="http://schemas.microsoft.com/office/powerpoint/2010/main" val="224524592"/>
       </p:ext>
     </p:extLst>
   </p:cSld>
@@ -5968,39 +6095,75 @@
           <a:chExt cx="0" cy="0"/>
         </a:xfrm>
       </p:grpSpPr>
-      <p:pic>
-        <p:nvPicPr>
-          <p:cNvPr id="5" name="내용 개체 틀 4">
+      <p:sp>
+        <p:nvSpPr>
+          <p:cNvPr id="2" name="제목 1">
             <a:extLst>
               <a:ext uri="{FF2B5EF4-FFF2-40B4-BE49-F238E27FC236}">
-                <a16:creationId xmlns:a16="http://schemas.microsoft.com/office/drawing/2014/main" id="{5D5DE8B5-BCDA-434A-B280-92A9BD8F2488}"/>
+                <a16:creationId xmlns:a16="http://schemas.microsoft.com/office/drawing/2014/main" id="{23533C7F-DBB7-4E13-A004-0751FEDBF5E5}"/>
               </a:ext>
             </a:extLst>
           </p:cNvPr>
-          <p:cNvPicPr>
-            <a:picLocks noGrp="1" noChangeAspect="1"/>
-          </p:cNvPicPr>
+          <p:cNvSpPr>
+            <a:spLocks noGrp="1"/>
+          </p:cNvSpPr>
+          <p:nvPr>
+            <p:ph type="title"/>
+          </p:nvPr>
+        </p:nvSpPr>
+        <p:spPr/>
+        <p:txBody>
+          <a:bodyPr/>
+          <a:lstStyle/>
+          <a:p>
+            <a:r>
+              <a:rPr lang="ko-KR" altLang="en-US" dirty="0"/>
+              <a:t>읽어보면 좋은 </a:t>
+            </a:r>
+            <a:r>
+              <a:rPr lang="en-US" altLang="ko-KR" dirty="0"/>
+              <a:t>Binary Search </a:t>
+            </a:r>
+            <a:r>
+              <a:rPr lang="ko-KR" altLang="en-US" dirty="0"/>
+              <a:t>글</a:t>
+            </a:r>
+          </a:p>
+        </p:txBody>
+      </p:sp>
+      <p:sp>
+        <p:nvSpPr>
+          <p:cNvPr id="3" name="내용 개체 틀 2">
+            <a:extLst>
+              <a:ext uri="{FF2B5EF4-FFF2-40B4-BE49-F238E27FC236}">
+                <a16:creationId xmlns:a16="http://schemas.microsoft.com/office/drawing/2014/main" id="{B6AEDDE2-0C12-4805-A893-C00C943A7F7F}"/>
+              </a:ext>
+            </a:extLst>
+          </p:cNvPr>
+          <p:cNvSpPr>
+            <a:spLocks noGrp="1"/>
+          </p:cNvSpPr>
           <p:nvPr>
             <p:ph idx="1"/>
           </p:nvPr>
-        </p:nvPicPr>
-        <p:blipFill>
-          <a:blip r:embed="rId2"/>
-          <a:stretch>
-            <a:fillRect/>
-          </a:stretch>
-        </p:blipFill>
-        <p:spPr>
-          <a:xfrm>
-            <a:off x="740144" y="388162"/>
-            <a:ext cx="10139368" cy="5179518"/>
-          </a:xfrm>
-        </p:spPr>
-      </p:pic>
+        </p:nvSpPr>
+        <p:spPr/>
+        <p:txBody>
+          <a:bodyPr/>
+          <a:lstStyle/>
+          <a:p>
+            <a:r>
+              <a:rPr lang="en-US" altLang="ko-KR" dirty="0"/>
+              <a:t>https://www.acmicpc.net/blog/view/109</a:t>
+            </a:r>
+            <a:endParaRPr lang="ko-KR" altLang="en-US" dirty="0"/>
+          </a:p>
+        </p:txBody>
+      </p:sp>
     </p:spTree>
     <p:extLst>
       <p:ext uri="{BB962C8B-B14F-4D97-AF65-F5344CB8AC3E}">
-        <p14:creationId xmlns:p14="http://schemas.microsoft.com/office/powerpoint/2010/main" val="2924990821"/>
+        <p14:creationId xmlns:p14="http://schemas.microsoft.com/office/powerpoint/2010/main" val="941012524"/>
       </p:ext>
     </p:extLst>
   </p:cSld>
@@ -6029,19 +6192,17 @@
       </p:grpSpPr>
       <p:pic>
         <p:nvPicPr>
-          <p:cNvPr id="5" name="내용 개체 틀 4">
+          <p:cNvPr id="5" name="그림 4">
             <a:extLst>
               <a:ext uri="{FF2B5EF4-FFF2-40B4-BE49-F238E27FC236}">
-                <a16:creationId xmlns:a16="http://schemas.microsoft.com/office/drawing/2014/main" id="{C5104F70-60B4-4B36-9BB4-00444D39169F}"/>
+                <a16:creationId xmlns:a16="http://schemas.microsoft.com/office/drawing/2014/main" id="{2147CEE7-E493-49C1-A6BD-A9F0BE91E7BC}"/>
               </a:ext>
             </a:extLst>
           </p:cNvPr>
           <p:cNvPicPr>
-            <a:picLocks noGrp="1" noChangeAspect="1"/>
+            <a:picLocks noChangeAspect="1"/>
           </p:cNvPicPr>
-          <p:nvPr>
-            <p:ph idx="1"/>
-          </p:nvPr>
+          <p:nvPr/>
         </p:nvPicPr>
         <p:blipFill>
           <a:blip r:embed="rId2"/>
@@ -6051,15 +6212,65 @@
         </p:blipFill>
         <p:spPr>
           <a:xfrm>
-            <a:off x="748754" y="83820"/>
-            <a:ext cx="8810077" cy="6690360"/>
-          </a:xfrm>
+            <a:off x="463617" y="209100"/>
+            <a:ext cx="8135485" cy="6439799"/>
+          </a:xfrm>
+          <a:prstGeom prst="rect">
+            <a:avLst/>
+          </a:prstGeom>
+        </p:spPr>
+      </p:pic>
+      <p:pic>
+        <p:nvPicPr>
+          <p:cNvPr id="9" name="Picture 2">
+            <a:extLst>
+              <a:ext uri="{FF2B5EF4-FFF2-40B4-BE49-F238E27FC236}">
+                <a16:creationId xmlns:a16="http://schemas.microsoft.com/office/drawing/2014/main" id="{C8D943E2-32E6-4714-9C74-B5C4757B7570}"/>
+              </a:ext>
+            </a:extLst>
+          </p:cNvPr>
+          <p:cNvPicPr>
+            <a:picLocks noGrp="1" noChangeAspect="1" noChangeArrowheads="1"/>
+          </p:cNvPicPr>
+          <p:nvPr>
+            <p:ph idx="1"/>
+          </p:nvPr>
+        </p:nvPicPr>
+        <p:blipFill rotWithShape="1">
+          <a:blip r:embed="rId3">
+            <a:extLst>
+              <a:ext uri="{28A0092B-C50C-407E-A947-70E740481C1C}">
+                <a14:useLocalDpi xmlns:a14="http://schemas.microsoft.com/office/drawing/2010/main" val="0"/>
+              </a:ext>
+            </a:extLst>
+          </a:blip>
+          <a:srcRect l="86624" t="62171" r="163" b="31037"/>
+          <a:stretch/>
+        </p:blipFill>
+        <p:spPr bwMode="auto">
+          <a:xfrm>
+            <a:off x="8469936" y="2363777"/>
+            <a:ext cx="3942080" cy="1351280"/>
+          </a:xfrm>
+          <a:prstGeom prst="rect">
+            <a:avLst/>
+          </a:prstGeom>
+          <a:noFill/>
+          <a:extLst>
+            <a:ext uri="{909E8E84-426E-40DD-AFC4-6F175D3DCCD1}">
+              <a14:hiddenFill xmlns:a14="http://schemas.microsoft.com/office/drawing/2010/main">
+                <a:solidFill>
+                  <a:srgbClr val="FFFFFF"/>
+                </a:solidFill>
+              </a14:hiddenFill>
+            </a:ext>
+          </a:extLst>
         </p:spPr>
       </p:pic>
     </p:spTree>
     <p:extLst>
       <p:ext uri="{BB962C8B-B14F-4D97-AF65-F5344CB8AC3E}">
-        <p14:creationId xmlns:p14="http://schemas.microsoft.com/office/powerpoint/2010/main" val="445342889"/>
+        <p14:creationId xmlns:p14="http://schemas.microsoft.com/office/powerpoint/2010/main" val="3169485616"/>
       </p:ext>
     </p:extLst>
   </p:cSld>
@@ -6086,241 +6297,39 @@
           <a:chExt cx="0" cy="0"/>
         </a:xfrm>
       </p:grpSpPr>
-      <p:sp>
-        <p:nvSpPr>
-          <p:cNvPr id="2" name="제목 1">
+      <p:pic>
+        <p:nvPicPr>
+          <p:cNvPr id="5" name="내용 개체 틀 4">
             <a:extLst>
               <a:ext uri="{FF2B5EF4-FFF2-40B4-BE49-F238E27FC236}">
-                <a16:creationId xmlns:a16="http://schemas.microsoft.com/office/drawing/2014/main" id="{EE6EF813-4D31-4A44-BD77-4E6294D06666}"/>
+                <a16:creationId xmlns:a16="http://schemas.microsoft.com/office/drawing/2014/main" id="{5D5DE8B5-BCDA-434A-B280-92A9BD8F2488}"/>
               </a:ext>
             </a:extLst>
           </p:cNvPr>
-          <p:cNvSpPr>
-            <a:spLocks noGrp="1"/>
-          </p:cNvSpPr>
-          <p:nvPr>
-            <p:ph type="title"/>
-          </p:nvPr>
-        </p:nvSpPr>
-        <p:spPr/>
-        <p:txBody>
-          <a:bodyPr/>
-          <a:lstStyle/>
-          <a:p>
-            <a:r>
-              <a:rPr lang="en-US" altLang="ko-KR" dirty="0"/>
-              <a:t>GCD</a:t>
-            </a:r>
-            <a:endParaRPr lang="ko-KR" altLang="en-US" dirty="0"/>
-          </a:p>
-        </p:txBody>
-      </p:sp>
-      <p:sp>
-        <p:nvSpPr>
-          <p:cNvPr id="3" name="내용 개체 틀 2">
-            <a:extLst>
-              <a:ext uri="{FF2B5EF4-FFF2-40B4-BE49-F238E27FC236}">
-                <a16:creationId xmlns:a16="http://schemas.microsoft.com/office/drawing/2014/main" id="{434C28D4-2DAE-4C10-AC5C-A988AA390E4A}"/>
-              </a:ext>
-            </a:extLst>
-          </p:cNvPr>
-          <p:cNvSpPr>
-            <a:spLocks noGrp="1"/>
-          </p:cNvSpPr>
+          <p:cNvPicPr>
+            <a:picLocks noGrp="1" noChangeAspect="1"/>
+          </p:cNvPicPr>
           <p:nvPr>
             <p:ph idx="1"/>
           </p:nvPr>
-        </p:nvSpPr>
-        <p:spPr/>
-        <p:txBody>
-          <a:bodyPr>
-            <a:normAutofit lnSpcReduction="10000"/>
-          </a:bodyPr>
-          <a:lstStyle/>
-          <a:p>
-            <a:r>
-              <a:rPr lang="en-US" altLang="ko-KR" b="0" i="0" dirty="0">
-                <a:solidFill>
-                  <a:srgbClr val="202124"/>
-                </a:solidFill>
-                <a:effectLst/>
-              </a:rPr>
-              <a:t>The </a:t>
-            </a:r>
-            <a:r>
-              <a:rPr lang="en-US" altLang="ko-KR" b="1" i="0" dirty="0">
-                <a:solidFill>
-                  <a:srgbClr val="202124"/>
-                </a:solidFill>
-                <a:effectLst/>
-              </a:rPr>
-              <a:t>greatest common divisor </a:t>
-            </a:r>
-            <a:r>
-              <a:rPr lang="en-US" altLang="ko-KR" i="0" dirty="0">
-                <a:solidFill>
-                  <a:srgbClr val="202124"/>
-                </a:solidFill>
-                <a:effectLst/>
-              </a:rPr>
-              <a:t> </a:t>
-            </a:r>
-          </a:p>
-          <a:p>
-            <a:r>
-              <a:rPr lang="en-US" altLang="ko-KR" dirty="0">
-                <a:solidFill>
-                  <a:srgbClr val="202124"/>
-                </a:solidFill>
-              </a:rPr>
-              <a:t>== </a:t>
-            </a:r>
-            <a:r>
-              <a:rPr lang="ko-KR" altLang="en-US" dirty="0">
-                <a:solidFill>
-                  <a:srgbClr val="202124"/>
-                </a:solidFill>
-              </a:rPr>
-              <a:t>최대 공약수 </a:t>
-            </a:r>
-            <a:endParaRPr lang="en-US" altLang="ko-KR" dirty="0">
-              <a:solidFill>
-                <a:srgbClr val="202124"/>
-              </a:solidFill>
-            </a:endParaRPr>
-          </a:p>
-          <a:p>
-            <a:endParaRPr lang="en-US" altLang="ko-KR" dirty="0">
-              <a:solidFill>
-                <a:srgbClr val="202124"/>
-              </a:solidFill>
-            </a:endParaRPr>
-          </a:p>
-          <a:p>
-            <a:r>
-              <a:rPr lang="ko-KR" altLang="en-US" dirty="0">
-                <a:solidFill>
-                  <a:srgbClr val="202124"/>
-                </a:solidFill>
-              </a:rPr>
-              <a:t>두 수를 나누는 제일 큰 공약수 </a:t>
-            </a:r>
-            <a:endParaRPr lang="en-US" altLang="ko-KR" dirty="0">
-              <a:solidFill>
-                <a:srgbClr val="202124"/>
-              </a:solidFill>
-            </a:endParaRPr>
-          </a:p>
-          <a:p>
-            <a:endParaRPr lang="en-US" altLang="ko-KR" dirty="0">
-              <a:solidFill>
-                <a:srgbClr val="202124"/>
-              </a:solidFill>
-            </a:endParaRPr>
-          </a:p>
-          <a:p>
-            <a:r>
-              <a:rPr lang="en-US" altLang="ko-KR" dirty="0">
-                <a:solidFill>
-                  <a:srgbClr val="202124"/>
-                </a:solidFill>
-              </a:rPr>
-              <a:t>A &lt; B </a:t>
-            </a:r>
-            <a:r>
-              <a:rPr lang="ko-KR" altLang="en-US" dirty="0">
-                <a:solidFill>
-                  <a:srgbClr val="202124"/>
-                </a:solidFill>
-              </a:rPr>
-              <a:t>일 때</a:t>
-            </a:r>
-            <a:r>
-              <a:rPr lang="en-US" altLang="ko-KR" dirty="0">
-                <a:solidFill>
-                  <a:srgbClr val="202124"/>
-                </a:solidFill>
-              </a:rPr>
-              <a:t>, 2 ~ A </a:t>
-            </a:r>
-            <a:r>
-              <a:rPr lang="ko-KR" altLang="en-US" dirty="0">
-                <a:solidFill>
-                  <a:srgbClr val="202124"/>
-                </a:solidFill>
-              </a:rPr>
-              <a:t>를 순회하면서 둘 다 나누어지는 수 중 가장 큰 수를  고르면 되면 안되나</a:t>
-            </a:r>
-            <a:r>
-              <a:rPr lang="en-US" altLang="ko-KR" dirty="0">
-                <a:solidFill>
-                  <a:srgbClr val="202124"/>
-                </a:solidFill>
-              </a:rPr>
-              <a:t>?</a:t>
-            </a:r>
-          </a:p>
-          <a:p>
-            <a:pPr marL="0" indent="0">
-              <a:buNone/>
-            </a:pPr>
-            <a:r>
-              <a:rPr lang="en-US" altLang="ko-KR" dirty="0">
-                <a:solidFill>
-                  <a:srgbClr val="202124"/>
-                </a:solidFill>
-              </a:rPr>
-              <a:t>  </a:t>
-            </a:r>
-            <a:r>
-              <a:rPr lang="en-US" altLang="ko-KR" dirty="0">
-                <a:solidFill>
-                  <a:srgbClr val="202124"/>
-                </a:solidFill>
-                <a:sym typeface="Wingdings" panose="05000000000000000000" pitchFamily="2" charset="2"/>
-              </a:rPr>
-              <a:t> O(N) </a:t>
-            </a:r>
-            <a:r>
-              <a:rPr lang="ko-KR" altLang="en-US" dirty="0">
-                <a:solidFill>
-                  <a:srgbClr val="202124"/>
-                </a:solidFill>
-                <a:sym typeface="Wingdings" panose="05000000000000000000" pitchFamily="2" charset="2"/>
-              </a:rPr>
-              <a:t>의 </a:t>
-            </a:r>
-            <a:r>
-              <a:rPr lang="ko-KR" altLang="en-US" dirty="0" err="1">
-                <a:solidFill>
-                  <a:srgbClr val="202124"/>
-                </a:solidFill>
-                <a:sym typeface="Wingdings" panose="05000000000000000000" pitchFamily="2" charset="2"/>
-              </a:rPr>
-              <a:t>시간복잡도</a:t>
-            </a:r>
-            <a:endParaRPr lang="en-US" altLang="ko-KR" dirty="0">
-              <a:solidFill>
-                <a:srgbClr val="202124"/>
-              </a:solidFill>
-            </a:endParaRPr>
-          </a:p>
-          <a:p>
-            <a:pPr marL="0" indent="0">
-              <a:buNone/>
-            </a:pPr>
-            <a:endParaRPr lang="en-US" altLang="ko-KR" dirty="0">
-              <a:solidFill>
-                <a:srgbClr val="202124"/>
-              </a:solidFill>
-            </a:endParaRPr>
-          </a:p>
-        </p:txBody>
-      </p:sp>
+        </p:nvPicPr>
+        <p:blipFill>
+          <a:blip r:embed="rId2"/>
+          <a:stretch>
+            <a:fillRect/>
+          </a:stretch>
+        </p:blipFill>
+        <p:spPr>
+          <a:xfrm>
+            <a:off x="740144" y="388162"/>
+            <a:ext cx="10139368" cy="5179518"/>
+          </a:xfrm>
+        </p:spPr>
+      </p:pic>
     </p:spTree>
     <p:extLst>
       <p:ext uri="{BB962C8B-B14F-4D97-AF65-F5344CB8AC3E}">
-        <p14:creationId xmlns:p14="http://schemas.microsoft.com/office/powerpoint/2010/main" val="1141413766"/>
+        <p14:creationId xmlns:p14="http://schemas.microsoft.com/office/powerpoint/2010/main" val="2924990821"/>
       </p:ext>
     </p:extLst>
   </p:cSld>
@@ -6347,45 +6356,12 @@
           <a:chExt cx="0" cy="0"/>
         </a:xfrm>
       </p:grpSpPr>
-      <p:sp>
-        <p:nvSpPr>
-          <p:cNvPr id="2" name="제목 1">
-            <a:extLst>
-              <a:ext uri="{FF2B5EF4-FFF2-40B4-BE49-F238E27FC236}">
-                <a16:creationId xmlns:a16="http://schemas.microsoft.com/office/drawing/2014/main" id="{6E8AC7D0-F4F3-4A21-8105-5F5C6CD9D91C}"/>
-              </a:ext>
-            </a:extLst>
-          </p:cNvPr>
-          <p:cNvSpPr>
-            <a:spLocks noGrp="1"/>
-          </p:cNvSpPr>
-          <p:nvPr>
-            <p:ph type="title"/>
-          </p:nvPr>
-        </p:nvSpPr>
-        <p:spPr/>
-        <p:txBody>
-          <a:bodyPr/>
-          <a:lstStyle/>
-          <a:p>
-            <a:r>
-              <a:rPr lang="ko-KR" altLang="en-US" dirty="0"/>
-              <a:t>유클리드 </a:t>
-            </a:r>
-            <a:r>
-              <a:rPr lang="ko-KR" altLang="en-US" dirty="0" err="1"/>
-              <a:t>호제법</a:t>
-            </a:r>
-            <a:endParaRPr lang="ko-KR" altLang="en-US" dirty="0"/>
-          </a:p>
-        </p:txBody>
-      </p:sp>
       <p:pic>
         <p:nvPicPr>
           <p:cNvPr id="5" name="내용 개체 틀 4">
             <a:extLst>
               <a:ext uri="{FF2B5EF4-FFF2-40B4-BE49-F238E27FC236}">
-                <a16:creationId xmlns:a16="http://schemas.microsoft.com/office/drawing/2014/main" id="{FBDE214B-C000-4476-8CF2-647F958EA15C}"/>
+                <a16:creationId xmlns:a16="http://schemas.microsoft.com/office/drawing/2014/main" id="{C5104F70-60B4-4B36-9BB4-00444D39169F}"/>
               </a:ext>
             </a:extLst>
           </p:cNvPr>
@@ -6404,15 +6380,15 @@
         </p:blipFill>
         <p:spPr>
           <a:xfrm>
-            <a:off x="1168829" y="1613743"/>
-            <a:ext cx="9602368" cy="4929297"/>
+            <a:off x="748754" y="83820"/>
+            <a:ext cx="8810077" cy="6690360"/>
           </a:xfrm>
         </p:spPr>
       </p:pic>
     </p:spTree>
     <p:extLst>
       <p:ext uri="{BB962C8B-B14F-4D97-AF65-F5344CB8AC3E}">
-        <p14:creationId xmlns:p14="http://schemas.microsoft.com/office/powerpoint/2010/main" val="1008030049"/>
+        <p14:creationId xmlns:p14="http://schemas.microsoft.com/office/powerpoint/2010/main" val="445342889"/>
       </p:ext>
     </p:extLst>
   </p:cSld>
@@ -6548,7 +6524,7 @@
           <p:cNvPr id="2" name="제목 1">
             <a:extLst>
               <a:ext uri="{FF2B5EF4-FFF2-40B4-BE49-F238E27FC236}">
-                <a16:creationId xmlns:a16="http://schemas.microsoft.com/office/drawing/2014/main" id="{F2F1E6CE-CBBF-47AA-9B99-D00AB9954C44}"/>
+                <a16:creationId xmlns:a16="http://schemas.microsoft.com/office/drawing/2014/main" id="{EE6EF813-4D31-4A44-BD77-4E6294D06666}"/>
               </a:ext>
             </a:extLst>
           </p:cNvPr>
@@ -6572,112 +6548,212 @@
           </a:p>
         </p:txBody>
       </p:sp>
-      <p:pic>
-        <p:nvPicPr>
-          <p:cNvPr id="5" name="내용 개체 틀 4">
+      <p:sp>
+        <p:nvSpPr>
+          <p:cNvPr id="3" name="내용 개체 틀 2">
             <a:extLst>
               <a:ext uri="{FF2B5EF4-FFF2-40B4-BE49-F238E27FC236}">
-                <a16:creationId xmlns:a16="http://schemas.microsoft.com/office/drawing/2014/main" id="{D5658363-CF7D-4E6E-91FB-38907051E96E}"/>
+                <a16:creationId xmlns:a16="http://schemas.microsoft.com/office/drawing/2014/main" id="{434C28D4-2DAE-4C10-AC5C-A988AA390E4A}"/>
               </a:ext>
             </a:extLst>
           </p:cNvPr>
-          <p:cNvPicPr>
-            <a:picLocks noGrp="1" noChangeAspect="1"/>
-          </p:cNvPicPr>
+          <p:cNvSpPr>
+            <a:spLocks noGrp="1"/>
+          </p:cNvSpPr>
           <p:nvPr>
             <p:ph idx="1"/>
           </p:nvPr>
-        </p:nvPicPr>
-        <p:blipFill>
-          <a:blip r:embed="rId2"/>
-          <a:stretch>
-            <a:fillRect/>
-          </a:stretch>
-        </p:blipFill>
-        <p:spPr>
-          <a:xfrm>
-            <a:off x="180702" y="1935960"/>
-            <a:ext cx="5537875" cy="4200680"/>
-          </a:xfrm>
-        </p:spPr>
-      </p:pic>
-      <p:pic>
-        <p:nvPicPr>
-          <p:cNvPr id="7" name="그림 6">
-            <a:extLst>
-              <a:ext uri="{FF2B5EF4-FFF2-40B4-BE49-F238E27FC236}">
-                <a16:creationId xmlns:a16="http://schemas.microsoft.com/office/drawing/2014/main" id="{E3147F21-E919-4BD0-B078-9320255F1A4A}"/>
-              </a:ext>
-            </a:extLst>
-          </p:cNvPr>
-          <p:cNvPicPr>
-            <a:picLocks noChangeAspect="1"/>
-          </p:cNvPicPr>
-          <p:nvPr/>
-        </p:nvPicPr>
-        <p:blipFill>
-          <a:blip r:embed="rId3"/>
-          <a:stretch>
-            <a:fillRect/>
-          </a:stretch>
-        </p:blipFill>
-        <p:spPr>
-          <a:xfrm>
-            <a:off x="6096000" y="2512328"/>
-            <a:ext cx="5888718" cy="1409431"/>
-          </a:xfrm>
-          <a:prstGeom prst="rect">
-            <a:avLst/>
-          </a:prstGeom>
-        </p:spPr>
-      </p:pic>
-      <p:sp>
-        <p:nvSpPr>
-          <p:cNvPr id="9" name="TextBox 8">
-            <a:extLst>
-              <a:ext uri="{FF2B5EF4-FFF2-40B4-BE49-F238E27FC236}">
-                <a16:creationId xmlns:a16="http://schemas.microsoft.com/office/drawing/2014/main" id="{E559B825-06AA-4EAB-BD3D-6F207F3AAC69}"/>
-              </a:ext>
-            </a:extLst>
-          </p:cNvPr>
-          <p:cNvSpPr txBox="1"/>
-          <p:nvPr/>
-        </p:nvSpPr>
-        <p:spPr>
-          <a:xfrm>
-            <a:off x="7335405" y="3976131"/>
-            <a:ext cx="3409908" cy="369332"/>
-          </a:xfrm>
-          <a:prstGeom prst="rect">
-            <a:avLst/>
-          </a:prstGeom>
-          <a:noFill/>
-        </p:spPr>
-        <p:txBody>
-          <a:bodyPr wrap="none" rtlCol="0">
-            <a:spAutoFit/>
+        </p:nvSpPr>
+        <p:spPr/>
+        <p:txBody>
+          <a:bodyPr>
+            <a:normAutofit lnSpcReduction="10000"/>
           </a:bodyPr>
           <a:lstStyle/>
           <a:p>
             <a:r>
-              <a:rPr lang="ko-KR" altLang="en-US" dirty="0"/>
-              <a:t>사전에 </a:t>
-            </a:r>
-            <a:r>
-              <a:rPr lang="en-US" altLang="ko-KR" dirty="0"/>
-              <a:t>num1 &gt; num2 </a:t>
-            </a:r>
-            <a:r>
-              <a:rPr lang="ko-KR" altLang="en-US" dirty="0"/>
-              <a:t>임을 체크</a:t>
-            </a:r>
+              <a:rPr lang="en-US" altLang="ko-KR" b="0" i="0" dirty="0">
+                <a:solidFill>
+                  <a:srgbClr val="202124"/>
+                </a:solidFill>
+                <a:effectLst/>
+              </a:rPr>
+              <a:t>The </a:t>
+            </a:r>
+            <a:r>
+              <a:rPr lang="en-US" altLang="ko-KR" b="1" i="0" dirty="0">
+                <a:solidFill>
+                  <a:srgbClr val="202124"/>
+                </a:solidFill>
+                <a:effectLst/>
+              </a:rPr>
+              <a:t>greatest common divisor </a:t>
+            </a:r>
+            <a:r>
+              <a:rPr lang="en-US" altLang="ko-KR" i="0" dirty="0">
+                <a:solidFill>
+                  <a:srgbClr val="202124"/>
+                </a:solidFill>
+                <a:effectLst/>
+              </a:rPr>
+              <a:t> </a:t>
+            </a:r>
+          </a:p>
+          <a:p>
+            <a:r>
+              <a:rPr lang="en-US" altLang="ko-KR" dirty="0">
+                <a:solidFill>
+                  <a:srgbClr val="202124"/>
+                </a:solidFill>
+              </a:rPr>
+              <a:t>== </a:t>
+            </a:r>
+            <a:r>
+              <a:rPr lang="ko-KR" altLang="en-US" dirty="0">
+                <a:solidFill>
+                  <a:srgbClr val="202124"/>
+                </a:solidFill>
+              </a:rPr>
+              <a:t>최대 공약수 </a:t>
+            </a:r>
+            <a:endParaRPr lang="en-US" altLang="ko-KR" dirty="0">
+              <a:solidFill>
+                <a:srgbClr val="202124"/>
+              </a:solidFill>
+            </a:endParaRPr>
+          </a:p>
+          <a:p>
+            <a:endParaRPr lang="en-US" altLang="ko-KR" dirty="0">
+              <a:solidFill>
+                <a:srgbClr val="202124"/>
+              </a:solidFill>
+            </a:endParaRPr>
+          </a:p>
+          <a:p>
+            <a:r>
+              <a:rPr lang="ko-KR" altLang="en-US" dirty="0">
+                <a:solidFill>
+                  <a:srgbClr val="202124"/>
+                </a:solidFill>
+              </a:rPr>
+              <a:t>두 수를 나누는 제일 큰 공약수 </a:t>
+            </a:r>
+            <a:endParaRPr lang="en-US" altLang="ko-KR" dirty="0">
+              <a:solidFill>
+                <a:srgbClr val="202124"/>
+              </a:solidFill>
+            </a:endParaRPr>
+          </a:p>
+          <a:p>
+            <a:endParaRPr lang="en-US" altLang="ko-KR" dirty="0">
+              <a:solidFill>
+                <a:srgbClr val="202124"/>
+              </a:solidFill>
+            </a:endParaRPr>
+          </a:p>
+          <a:p>
+            <a:r>
+              <a:rPr lang="en-US" altLang="ko-KR" dirty="0">
+                <a:solidFill>
+                  <a:srgbClr val="202124"/>
+                </a:solidFill>
+              </a:rPr>
+              <a:t>A &lt; B </a:t>
+            </a:r>
+            <a:r>
+              <a:rPr lang="ko-KR" altLang="en-US" dirty="0">
+                <a:solidFill>
+                  <a:srgbClr val="202124"/>
+                </a:solidFill>
+              </a:rPr>
+              <a:t>일 때</a:t>
+            </a:r>
+            <a:r>
+              <a:rPr lang="en-US" altLang="ko-KR" dirty="0">
+                <a:solidFill>
+                  <a:srgbClr val="202124"/>
+                </a:solidFill>
+              </a:rPr>
+              <a:t>, 2 ~ A </a:t>
+            </a:r>
+            <a:r>
+              <a:rPr lang="ko-KR" altLang="en-US" dirty="0">
+                <a:solidFill>
+                  <a:srgbClr val="202124"/>
+                </a:solidFill>
+              </a:rPr>
+              <a:t>를 순회하면서 둘 다 나누어지는 수 중 가장 큰 수를  고르면 되면 안되나</a:t>
+            </a:r>
+            <a:r>
+              <a:rPr lang="en-US" altLang="ko-KR" dirty="0">
+                <a:solidFill>
+                  <a:srgbClr val="202124"/>
+                </a:solidFill>
+              </a:rPr>
+              <a:t>?</a:t>
+            </a:r>
+          </a:p>
+          <a:p>
+            <a:pPr marL="0" indent="0">
+              <a:buNone/>
+            </a:pPr>
+            <a:r>
+              <a:rPr lang="en-US" altLang="ko-KR" dirty="0">
+                <a:solidFill>
+                  <a:srgbClr val="202124"/>
+                </a:solidFill>
+              </a:rPr>
+              <a:t>  </a:t>
+            </a:r>
+            <a:r>
+              <a:rPr lang="en-US" altLang="ko-KR" dirty="0">
+                <a:solidFill>
+                  <a:srgbClr val="202124"/>
+                </a:solidFill>
+                <a:sym typeface="Wingdings" panose="05000000000000000000" pitchFamily="2" charset="2"/>
+              </a:rPr>
+              <a:t> O(N) </a:t>
+            </a:r>
+            <a:r>
+              <a:rPr lang="ko-KR" altLang="en-US" dirty="0">
+                <a:solidFill>
+                  <a:srgbClr val="202124"/>
+                </a:solidFill>
+                <a:sym typeface="Wingdings" panose="05000000000000000000" pitchFamily="2" charset="2"/>
+              </a:rPr>
+              <a:t>의 </a:t>
+            </a:r>
+            <a:r>
+              <a:rPr lang="ko-KR" altLang="en-US" dirty="0" err="1">
+                <a:solidFill>
+                  <a:srgbClr val="202124"/>
+                </a:solidFill>
+                <a:sym typeface="Wingdings" panose="05000000000000000000" pitchFamily="2" charset="2"/>
+              </a:rPr>
+              <a:t>시간복잡도</a:t>
+            </a:r>
+            <a:endParaRPr lang="en-US" altLang="ko-KR" dirty="0">
+              <a:solidFill>
+                <a:srgbClr val="202124"/>
+              </a:solidFill>
+            </a:endParaRPr>
+          </a:p>
+          <a:p>
+            <a:pPr marL="0" indent="0">
+              <a:buNone/>
+            </a:pPr>
+            <a:endParaRPr lang="en-US" altLang="ko-KR" dirty="0">
+              <a:solidFill>
+                <a:srgbClr val="202124"/>
+              </a:solidFill>
+            </a:endParaRPr>
           </a:p>
         </p:txBody>
       </p:sp>
     </p:spTree>
     <p:extLst>
       <p:ext uri="{BB962C8B-B14F-4D97-AF65-F5344CB8AC3E}">
-        <p14:creationId xmlns:p14="http://schemas.microsoft.com/office/powerpoint/2010/main" val="1586061186"/>
+        <p14:creationId xmlns:p14="http://schemas.microsoft.com/office/powerpoint/2010/main" val="1141413766"/>
       </p:ext>
     </p:extLst>
   </p:cSld>
@@ -6709,7 +6785,7 @@
           <p:cNvPr id="2" name="제목 1">
             <a:extLst>
               <a:ext uri="{FF2B5EF4-FFF2-40B4-BE49-F238E27FC236}">
-                <a16:creationId xmlns:a16="http://schemas.microsoft.com/office/drawing/2014/main" id="{F2F1E6CE-CBBF-47AA-9B99-D00AB9954C44}"/>
+                <a16:creationId xmlns:a16="http://schemas.microsoft.com/office/drawing/2014/main" id="{6E8AC7D0-F4F3-4A21-8105-5F5C6CD9D91C}"/>
               </a:ext>
             </a:extLst>
           </p:cNvPr>
@@ -6726,8 +6802,12 @@
           <a:lstStyle/>
           <a:p>
             <a:r>
-              <a:rPr lang="en-US" altLang="ko-KR" dirty="0"/>
-              <a:t>LCM</a:t>
+              <a:rPr lang="ko-KR" altLang="en-US" dirty="0"/>
+              <a:t>유클리드 </a:t>
+            </a:r>
+            <a:r>
+              <a:rPr lang="ko-KR" altLang="en-US" dirty="0" err="1"/>
+              <a:t>호제법</a:t>
             </a:r>
             <a:endParaRPr lang="ko-KR" altLang="en-US" dirty="0"/>
           </a:p>
@@ -6738,7 +6818,7 @@
           <p:cNvPr id="5" name="내용 개체 틀 4">
             <a:extLst>
               <a:ext uri="{FF2B5EF4-FFF2-40B4-BE49-F238E27FC236}">
-                <a16:creationId xmlns:a16="http://schemas.microsoft.com/office/drawing/2014/main" id="{EBCE3EE7-419A-452B-8EB1-0E70688F44C3}"/>
+                <a16:creationId xmlns:a16="http://schemas.microsoft.com/office/drawing/2014/main" id="{FBDE214B-C000-4476-8CF2-647F958EA15C}"/>
               </a:ext>
             </a:extLst>
           </p:cNvPr>
@@ -6757,15 +6837,15 @@
         </p:blipFill>
         <p:spPr>
           <a:xfrm>
-            <a:off x="3013078" y="2844254"/>
-            <a:ext cx="6165844" cy="1615985"/>
+            <a:off x="1168829" y="1613743"/>
+            <a:ext cx="9602368" cy="4929297"/>
           </a:xfrm>
         </p:spPr>
       </p:pic>
     </p:spTree>
     <p:extLst>
       <p:ext uri="{BB962C8B-B14F-4D97-AF65-F5344CB8AC3E}">
-        <p14:creationId xmlns:p14="http://schemas.microsoft.com/office/powerpoint/2010/main" val="4071979801"/>
+        <p14:creationId xmlns:p14="http://schemas.microsoft.com/office/powerpoint/2010/main" val="1008030049"/>
       </p:ext>
     </p:extLst>
   </p:cSld>
@@ -6815,21 +6895,18 @@
           <a:p>
             <a:r>
               <a:rPr lang="en-US" altLang="ko-KR" dirty="0"/>
-              <a:t>Bit </a:t>
-            </a:r>
-            <a:r>
-              <a:rPr lang="ko-KR" altLang="en-US" dirty="0"/>
-              <a:t>연산</a:t>
-            </a:r>
+              <a:t>GCD</a:t>
+            </a:r>
+            <a:endParaRPr lang="ko-KR" altLang="en-US" dirty="0"/>
           </a:p>
         </p:txBody>
       </p:sp>
       <p:pic>
         <p:nvPicPr>
-          <p:cNvPr id="4" name="내용 개체 틀 3">
+          <p:cNvPr id="5" name="내용 개체 틀 4">
             <a:extLst>
               <a:ext uri="{FF2B5EF4-FFF2-40B4-BE49-F238E27FC236}">
-                <a16:creationId xmlns:a16="http://schemas.microsoft.com/office/drawing/2014/main" id="{3E4FACDE-CBAD-401A-B7AE-F740482E02C9}"/>
+                <a16:creationId xmlns:a16="http://schemas.microsoft.com/office/drawing/2014/main" id="{D5658363-CF7D-4E6E-91FB-38907051E96E}"/>
               </a:ext>
             </a:extLst>
           </p:cNvPr>
@@ -6848,20 +6925,17 @@
         </p:blipFill>
         <p:spPr>
           <a:xfrm>
-            <a:off x="152400" y="1783938"/>
-            <a:ext cx="4401164" cy="3734321"/>
-          </a:xfrm>
-          <a:prstGeom prst="rect">
-            <a:avLst/>
-          </a:prstGeom>
+            <a:off x="180702" y="1935960"/>
+            <a:ext cx="5537875" cy="4200680"/>
+          </a:xfrm>
         </p:spPr>
       </p:pic>
       <p:pic>
         <p:nvPicPr>
-          <p:cNvPr id="6" name="그림 5">
+          <p:cNvPr id="7" name="그림 6">
             <a:extLst>
               <a:ext uri="{FF2B5EF4-FFF2-40B4-BE49-F238E27FC236}">
-                <a16:creationId xmlns:a16="http://schemas.microsoft.com/office/drawing/2014/main" id="{92C5BE14-B02A-42A3-917B-41D75C9593A2}"/>
+                <a16:creationId xmlns:a16="http://schemas.microsoft.com/office/drawing/2014/main" id="{E3147F21-E919-4BD0-B078-9320255F1A4A}"/>
               </a:ext>
             </a:extLst>
           </p:cNvPr>
@@ -6878,48 +6952,61 @@
         </p:blipFill>
         <p:spPr>
           <a:xfrm>
-            <a:off x="4409184" y="1726779"/>
-            <a:ext cx="3658111" cy="3848637"/>
+            <a:off x="6096000" y="2512328"/>
+            <a:ext cx="5888718" cy="1409431"/>
           </a:xfrm>
           <a:prstGeom prst="rect">
             <a:avLst/>
           </a:prstGeom>
         </p:spPr>
       </p:pic>
-      <p:pic>
-        <p:nvPicPr>
-          <p:cNvPr id="8" name="그림 7">
+      <p:sp>
+        <p:nvSpPr>
+          <p:cNvPr id="9" name="TextBox 8">
             <a:extLst>
               <a:ext uri="{FF2B5EF4-FFF2-40B4-BE49-F238E27FC236}">
-                <a16:creationId xmlns:a16="http://schemas.microsoft.com/office/drawing/2014/main" id="{DFA946EE-F55E-42E7-B449-7EF6858C5A73}"/>
+                <a16:creationId xmlns:a16="http://schemas.microsoft.com/office/drawing/2014/main" id="{E559B825-06AA-4EAB-BD3D-6F207F3AAC69}"/>
               </a:ext>
             </a:extLst>
           </p:cNvPr>
-          <p:cNvPicPr>
-            <a:picLocks noChangeAspect="1"/>
-          </p:cNvPicPr>
+          <p:cNvSpPr txBox="1"/>
           <p:nvPr/>
-        </p:nvPicPr>
-        <p:blipFill>
-          <a:blip r:embed="rId4"/>
-          <a:stretch>
-            <a:fillRect/>
-          </a:stretch>
-        </p:blipFill>
+        </p:nvSpPr>
         <p:spPr>
           <a:xfrm>
-            <a:off x="8257711" y="1726779"/>
-            <a:ext cx="3324689" cy="2124371"/>
+            <a:off x="7335405" y="3976131"/>
+            <a:ext cx="3409908" cy="369332"/>
           </a:xfrm>
           <a:prstGeom prst="rect">
             <a:avLst/>
           </a:prstGeom>
-        </p:spPr>
-      </p:pic>
+          <a:noFill/>
+        </p:spPr>
+        <p:txBody>
+          <a:bodyPr wrap="none" rtlCol="0">
+            <a:spAutoFit/>
+          </a:bodyPr>
+          <a:lstStyle/>
+          <a:p>
+            <a:r>
+              <a:rPr lang="ko-KR" altLang="en-US" dirty="0"/>
+              <a:t>사전에 </a:t>
+            </a:r>
+            <a:r>
+              <a:rPr lang="en-US" altLang="ko-KR" dirty="0"/>
+              <a:t>num1 &gt; num2 </a:t>
+            </a:r>
+            <a:r>
+              <a:rPr lang="ko-KR" altLang="en-US" dirty="0"/>
+              <a:t>임을 체크</a:t>
+            </a:r>
+          </a:p>
+        </p:txBody>
+      </p:sp>
     </p:spTree>
     <p:extLst>
       <p:ext uri="{BB962C8B-B14F-4D97-AF65-F5344CB8AC3E}">
-        <p14:creationId xmlns:p14="http://schemas.microsoft.com/office/powerpoint/2010/main" val="3482195644"/>
+        <p14:creationId xmlns:p14="http://schemas.microsoft.com/office/powerpoint/2010/main" val="1586061186"/>
       </p:ext>
     </p:extLst>
   </p:cSld>
@@ -6951,7 +7038,7 @@
           <p:cNvPr id="2" name="제목 1">
             <a:extLst>
               <a:ext uri="{FF2B5EF4-FFF2-40B4-BE49-F238E27FC236}">
-                <a16:creationId xmlns:a16="http://schemas.microsoft.com/office/drawing/2014/main" id="{A8037E41-DF46-4E2E-8937-8D29058BA838}"/>
+                <a16:creationId xmlns:a16="http://schemas.microsoft.com/office/drawing/2014/main" id="{F2F1E6CE-CBBF-47AA-9B99-D00AB9954C44}"/>
               </a:ext>
             </a:extLst>
           </p:cNvPr>
@@ -6968,162 +7055,46 @@
           <a:lstStyle/>
           <a:p>
             <a:r>
-              <a:rPr lang="ko-KR" altLang="en-US" dirty="0"/>
-              <a:t>특정 자리수가 </a:t>
-            </a:r>
-            <a:r>
               <a:rPr lang="en-US" altLang="ko-KR" dirty="0"/>
-              <a:t>1</a:t>
-            </a:r>
-            <a:r>
-              <a:rPr lang="ko-KR" altLang="en-US" dirty="0"/>
-              <a:t>인지 확인</a:t>
-            </a:r>
-          </a:p>
-        </p:txBody>
-      </p:sp>
-      <p:sp>
-        <p:nvSpPr>
-          <p:cNvPr id="3" name="내용 개체 틀 2">
+              <a:t>LCM</a:t>
+            </a:r>
+            <a:endParaRPr lang="ko-KR" altLang="en-US" dirty="0"/>
+          </a:p>
+        </p:txBody>
+      </p:sp>
+      <p:pic>
+        <p:nvPicPr>
+          <p:cNvPr id="5" name="내용 개체 틀 4">
             <a:extLst>
               <a:ext uri="{FF2B5EF4-FFF2-40B4-BE49-F238E27FC236}">
-                <a16:creationId xmlns:a16="http://schemas.microsoft.com/office/drawing/2014/main" id="{6A2E15F0-75ED-4A06-AC7A-F6F1CEEF512F}"/>
+                <a16:creationId xmlns:a16="http://schemas.microsoft.com/office/drawing/2014/main" id="{EBCE3EE7-419A-452B-8EB1-0E70688F44C3}"/>
               </a:ext>
             </a:extLst>
           </p:cNvPr>
-          <p:cNvSpPr>
-            <a:spLocks noGrp="1"/>
-          </p:cNvSpPr>
+          <p:cNvPicPr>
+            <a:picLocks noGrp="1" noChangeAspect="1"/>
+          </p:cNvPicPr>
           <p:nvPr>
             <p:ph idx="1"/>
           </p:nvPr>
-        </p:nvSpPr>
+        </p:nvPicPr>
+        <p:blipFill>
+          <a:blip r:embed="rId2"/>
+          <a:stretch>
+            <a:fillRect/>
+          </a:stretch>
+        </p:blipFill>
         <p:spPr>
           <a:xfrm>
-            <a:off x="609600" y="1600201"/>
-            <a:ext cx="10027920" cy="988645"/>
-          </a:xfrm>
-        </p:spPr>
-        <p:txBody>
-          <a:bodyPr/>
-          <a:lstStyle/>
-          <a:p>
-            <a:r>
-              <a:rPr lang="en-US" altLang="ko-KR" dirty="0"/>
-              <a:t>And, Shift</a:t>
-            </a:r>
-          </a:p>
-        </p:txBody>
-      </p:sp>
-      <p:sp>
-        <p:nvSpPr>
-          <p:cNvPr id="10" name="TextBox 9">
-            <a:extLst>
-              <a:ext uri="{FF2B5EF4-FFF2-40B4-BE49-F238E27FC236}">
-                <a16:creationId xmlns:a16="http://schemas.microsoft.com/office/drawing/2014/main" id="{51F7C76E-AD47-40E0-B19B-A4E57BAB7AC2}"/>
-              </a:ext>
-            </a:extLst>
-          </p:cNvPr>
-          <p:cNvSpPr txBox="1"/>
-          <p:nvPr/>
-        </p:nvSpPr>
-        <p:spPr>
-          <a:xfrm>
-            <a:off x="5674360" y="3604384"/>
-            <a:ext cx="497840" cy="646331"/>
-          </a:xfrm>
-          <a:prstGeom prst="rect">
-            <a:avLst/>
-          </a:prstGeom>
-          <a:noFill/>
-        </p:spPr>
-        <p:txBody>
-          <a:bodyPr wrap="square">
-            <a:spAutoFit/>
-          </a:bodyPr>
-          <a:lstStyle/>
-          <a:p>
-            <a:r>
-              <a:rPr lang="en-US" altLang="ko-KR" sz="3600" dirty="0"/>
-              <a:t>1</a:t>
-            </a:r>
-          </a:p>
-        </p:txBody>
-      </p:sp>
-      <p:sp>
-        <p:nvSpPr>
-          <p:cNvPr id="11" name="TextBox 10">
-            <a:extLst>
-              <a:ext uri="{FF2B5EF4-FFF2-40B4-BE49-F238E27FC236}">
-                <a16:creationId xmlns:a16="http://schemas.microsoft.com/office/drawing/2014/main" id="{0010225C-1D45-4C4E-B8F8-EE4634766369}"/>
-              </a:ext>
-            </a:extLst>
-          </p:cNvPr>
-          <p:cNvSpPr txBox="1"/>
-          <p:nvPr/>
-        </p:nvSpPr>
-        <p:spPr>
-          <a:xfrm>
-            <a:off x="2875280" y="2903579"/>
-            <a:ext cx="3474720" cy="646331"/>
-          </a:xfrm>
-          <a:prstGeom prst="rect">
-            <a:avLst/>
-          </a:prstGeom>
-          <a:noFill/>
-        </p:spPr>
-        <p:txBody>
-          <a:bodyPr wrap="square">
-            <a:spAutoFit/>
-          </a:bodyPr>
-          <a:lstStyle/>
-          <a:p>
-            <a:r>
-              <a:rPr lang="en-US" altLang="ko-KR" sz="3600" spc="600" dirty="0"/>
-              <a:t>1010 1001 </a:t>
-            </a:r>
-          </a:p>
-        </p:txBody>
-      </p:sp>
-      <p:sp>
-        <p:nvSpPr>
-          <p:cNvPr id="12" name="TextBox 11">
-            <a:extLst>
-              <a:ext uri="{FF2B5EF4-FFF2-40B4-BE49-F238E27FC236}">
-                <a16:creationId xmlns:a16="http://schemas.microsoft.com/office/drawing/2014/main" id="{6B57DB4D-198B-4355-AEF7-4C0954BB7F45}"/>
-              </a:ext>
-            </a:extLst>
-          </p:cNvPr>
-          <p:cNvSpPr txBox="1"/>
-          <p:nvPr/>
-        </p:nvSpPr>
-        <p:spPr>
-          <a:xfrm>
-            <a:off x="2562860" y="3622824"/>
-            <a:ext cx="1651000" cy="646331"/>
-          </a:xfrm>
-          <a:prstGeom prst="rect">
-            <a:avLst/>
-          </a:prstGeom>
-          <a:noFill/>
-        </p:spPr>
-        <p:txBody>
-          <a:bodyPr wrap="square">
-            <a:spAutoFit/>
-          </a:bodyPr>
-          <a:lstStyle/>
-          <a:p>
-            <a:r>
-              <a:rPr lang="en-US" altLang="ko-KR" sz="3600" dirty="0"/>
-              <a:t>And</a:t>
-            </a:r>
-          </a:p>
-        </p:txBody>
-      </p:sp>
+            <a:off x="3013078" y="2844254"/>
+            <a:ext cx="6165844" cy="1615985"/>
+          </a:xfrm>
+        </p:spPr>
+      </p:pic>
     </p:spTree>
     <p:extLst>
       <p:ext uri="{BB962C8B-B14F-4D97-AF65-F5344CB8AC3E}">
-        <p14:creationId xmlns:p14="http://schemas.microsoft.com/office/powerpoint/2010/main" val="51924673"/>
+        <p14:creationId xmlns:p14="http://schemas.microsoft.com/office/powerpoint/2010/main" val="4071979801"/>
       </p:ext>
     </p:extLst>
   </p:cSld>
@@ -7155,6 +7126,364 @@
           <p:cNvPr id="2" name="제목 1">
             <a:extLst>
               <a:ext uri="{FF2B5EF4-FFF2-40B4-BE49-F238E27FC236}">
+                <a16:creationId xmlns:a16="http://schemas.microsoft.com/office/drawing/2014/main" id="{F2F1E6CE-CBBF-47AA-9B99-D00AB9954C44}"/>
+              </a:ext>
+            </a:extLst>
+          </p:cNvPr>
+          <p:cNvSpPr>
+            <a:spLocks noGrp="1"/>
+          </p:cNvSpPr>
+          <p:nvPr>
+            <p:ph type="title"/>
+          </p:nvPr>
+        </p:nvSpPr>
+        <p:spPr/>
+        <p:txBody>
+          <a:bodyPr/>
+          <a:lstStyle/>
+          <a:p>
+            <a:r>
+              <a:rPr lang="en-US" altLang="ko-KR" dirty="0"/>
+              <a:t>Bit </a:t>
+            </a:r>
+            <a:r>
+              <a:rPr lang="ko-KR" altLang="en-US" dirty="0"/>
+              <a:t>연산</a:t>
+            </a:r>
+          </a:p>
+        </p:txBody>
+      </p:sp>
+      <p:pic>
+        <p:nvPicPr>
+          <p:cNvPr id="4" name="내용 개체 틀 3">
+            <a:extLst>
+              <a:ext uri="{FF2B5EF4-FFF2-40B4-BE49-F238E27FC236}">
+                <a16:creationId xmlns:a16="http://schemas.microsoft.com/office/drawing/2014/main" id="{3E4FACDE-CBAD-401A-B7AE-F740482E02C9}"/>
+              </a:ext>
+            </a:extLst>
+          </p:cNvPr>
+          <p:cNvPicPr>
+            <a:picLocks noGrp="1" noChangeAspect="1"/>
+          </p:cNvPicPr>
+          <p:nvPr>
+            <p:ph idx="1"/>
+          </p:nvPr>
+        </p:nvPicPr>
+        <p:blipFill>
+          <a:blip r:embed="rId2"/>
+          <a:stretch>
+            <a:fillRect/>
+          </a:stretch>
+        </p:blipFill>
+        <p:spPr>
+          <a:xfrm>
+            <a:off x="152400" y="1783938"/>
+            <a:ext cx="4401164" cy="3734321"/>
+          </a:xfrm>
+          <a:prstGeom prst="rect">
+            <a:avLst/>
+          </a:prstGeom>
+        </p:spPr>
+      </p:pic>
+      <p:pic>
+        <p:nvPicPr>
+          <p:cNvPr id="6" name="그림 5">
+            <a:extLst>
+              <a:ext uri="{FF2B5EF4-FFF2-40B4-BE49-F238E27FC236}">
+                <a16:creationId xmlns:a16="http://schemas.microsoft.com/office/drawing/2014/main" id="{92C5BE14-B02A-42A3-917B-41D75C9593A2}"/>
+              </a:ext>
+            </a:extLst>
+          </p:cNvPr>
+          <p:cNvPicPr>
+            <a:picLocks noChangeAspect="1"/>
+          </p:cNvPicPr>
+          <p:nvPr/>
+        </p:nvPicPr>
+        <p:blipFill>
+          <a:blip r:embed="rId3"/>
+          <a:stretch>
+            <a:fillRect/>
+          </a:stretch>
+        </p:blipFill>
+        <p:spPr>
+          <a:xfrm>
+            <a:off x="4409184" y="1726779"/>
+            <a:ext cx="3658111" cy="3848637"/>
+          </a:xfrm>
+          <a:prstGeom prst="rect">
+            <a:avLst/>
+          </a:prstGeom>
+        </p:spPr>
+      </p:pic>
+      <p:pic>
+        <p:nvPicPr>
+          <p:cNvPr id="8" name="그림 7">
+            <a:extLst>
+              <a:ext uri="{FF2B5EF4-FFF2-40B4-BE49-F238E27FC236}">
+                <a16:creationId xmlns:a16="http://schemas.microsoft.com/office/drawing/2014/main" id="{DFA946EE-F55E-42E7-B449-7EF6858C5A73}"/>
+              </a:ext>
+            </a:extLst>
+          </p:cNvPr>
+          <p:cNvPicPr>
+            <a:picLocks noChangeAspect="1"/>
+          </p:cNvPicPr>
+          <p:nvPr/>
+        </p:nvPicPr>
+        <p:blipFill>
+          <a:blip r:embed="rId4"/>
+          <a:stretch>
+            <a:fillRect/>
+          </a:stretch>
+        </p:blipFill>
+        <p:spPr>
+          <a:xfrm>
+            <a:off x="8257711" y="1726779"/>
+            <a:ext cx="3324689" cy="2124371"/>
+          </a:xfrm>
+          <a:prstGeom prst="rect">
+            <a:avLst/>
+          </a:prstGeom>
+        </p:spPr>
+      </p:pic>
+    </p:spTree>
+    <p:extLst>
+      <p:ext uri="{BB962C8B-B14F-4D97-AF65-F5344CB8AC3E}">
+        <p14:creationId xmlns:p14="http://schemas.microsoft.com/office/powerpoint/2010/main" val="3482195644"/>
+      </p:ext>
+    </p:extLst>
+  </p:cSld>
+  <p:clrMapOvr>
+    <a:masterClrMapping/>
+  </p:clrMapOvr>
+</p:sld>
+</file>
+
+<file path=ppt/slides/slide25.xml><?xml version="1.0" encoding="utf-8"?>
+<p:sld xmlns:a="http://schemas.openxmlformats.org/drawingml/2006/main" xmlns:r="http://schemas.openxmlformats.org/officeDocument/2006/relationships" xmlns:p="http://schemas.openxmlformats.org/presentationml/2006/main">
+  <p:cSld>
+    <p:spTree>
+      <p:nvGrpSpPr>
+        <p:cNvPr id="1" name=""/>
+        <p:cNvGrpSpPr/>
+        <p:nvPr/>
+      </p:nvGrpSpPr>
+      <p:grpSpPr>
+        <a:xfrm>
+          <a:off x="0" y="0"/>
+          <a:ext cx="0" cy="0"/>
+          <a:chOff x="0" y="0"/>
+          <a:chExt cx="0" cy="0"/>
+        </a:xfrm>
+      </p:grpSpPr>
+      <p:sp>
+        <p:nvSpPr>
+          <p:cNvPr id="2" name="제목 1">
+            <a:extLst>
+              <a:ext uri="{FF2B5EF4-FFF2-40B4-BE49-F238E27FC236}">
+                <a16:creationId xmlns:a16="http://schemas.microsoft.com/office/drawing/2014/main" id="{A8037E41-DF46-4E2E-8937-8D29058BA838}"/>
+              </a:ext>
+            </a:extLst>
+          </p:cNvPr>
+          <p:cNvSpPr>
+            <a:spLocks noGrp="1"/>
+          </p:cNvSpPr>
+          <p:nvPr>
+            <p:ph type="title"/>
+          </p:nvPr>
+        </p:nvSpPr>
+        <p:spPr/>
+        <p:txBody>
+          <a:bodyPr/>
+          <a:lstStyle/>
+          <a:p>
+            <a:r>
+              <a:rPr lang="ko-KR" altLang="en-US" dirty="0"/>
+              <a:t>특정 자리수가 </a:t>
+            </a:r>
+            <a:r>
+              <a:rPr lang="en-US" altLang="ko-KR" dirty="0"/>
+              <a:t>1</a:t>
+            </a:r>
+            <a:r>
+              <a:rPr lang="ko-KR" altLang="en-US" dirty="0"/>
+              <a:t>인지 확인</a:t>
+            </a:r>
+          </a:p>
+        </p:txBody>
+      </p:sp>
+      <p:sp>
+        <p:nvSpPr>
+          <p:cNvPr id="3" name="내용 개체 틀 2">
+            <a:extLst>
+              <a:ext uri="{FF2B5EF4-FFF2-40B4-BE49-F238E27FC236}">
+                <a16:creationId xmlns:a16="http://schemas.microsoft.com/office/drawing/2014/main" id="{6A2E15F0-75ED-4A06-AC7A-F6F1CEEF512F}"/>
+              </a:ext>
+            </a:extLst>
+          </p:cNvPr>
+          <p:cNvSpPr>
+            <a:spLocks noGrp="1"/>
+          </p:cNvSpPr>
+          <p:nvPr>
+            <p:ph idx="1"/>
+          </p:nvPr>
+        </p:nvSpPr>
+        <p:spPr>
+          <a:xfrm>
+            <a:off x="609600" y="1600201"/>
+            <a:ext cx="10027920" cy="988645"/>
+          </a:xfrm>
+        </p:spPr>
+        <p:txBody>
+          <a:bodyPr/>
+          <a:lstStyle/>
+          <a:p>
+            <a:r>
+              <a:rPr lang="en-US" altLang="ko-KR" dirty="0"/>
+              <a:t>And, Shift</a:t>
+            </a:r>
+          </a:p>
+        </p:txBody>
+      </p:sp>
+      <p:sp>
+        <p:nvSpPr>
+          <p:cNvPr id="10" name="TextBox 9">
+            <a:extLst>
+              <a:ext uri="{FF2B5EF4-FFF2-40B4-BE49-F238E27FC236}">
+                <a16:creationId xmlns:a16="http://schemas.microsoft.com/office/drawing/2014/main" id="{51F7C76E-AD47-40E0-B19B-A4E57BAB7AC2}"/>
+              </a:ext>
+            </a:extLst>
+          </p:cNvPr>
+          <p:cNvSpPr txBox="1"/>
+          <p:nvPr/>
+        </p:nvSpPr>
+        <p:spPr>
+          <a:xfrm>
+            <a:off x="5674360" y="3604384"/>
+            <a:ext cx="497840" cy="646331"/>
+          </a:xfrm>
+          <a:prstGeom prst="rect">
+            <a:avLst/>
+          </a:prstGeom>
+          <a:noFill/>
+        </p:spPr>
+        <p:txBody>
+          <a:bodyPr wrap="square">
+            <a:spAutoFit/>
+          </a:bodyPr>
+          <a:lstStyle/>
+          <a:p>
+            <a:r>
+              <a:rPr lang="en-US" altLang="ko-KR" sz="3600" dirty="0"/>
+              <a:t>1</a:t>
+            </a:r>
+          </a:p>
+        </p:txBody>
+      </p:sp>
+      <p:sp>
+        <p:nvSpPr>
+          <p:cNvPr id="11" name="TextBox 10">
+            <a:extLst>
+              <a:ext uri="{FF2B5EF4-FFF2-40B4-BE49-F238E27FC236}">
+                <a16:creationId xmlns:a16="http://schemas.microsoft.com/office/drawing/2014/main" id="{0010225C-1D45-4C4E-B8F8-EE4634766369}"/>
+              </a:ext>
+            </a:extLst>
+          </p:cNvPr>
+          <p:cNvSpPr txBox="1"/>
+          <p:nvPr/>
+        </p:nvSpPr>
+        <p:spPr>
+          <a:xfrm>
+            <a:off x="2875280" y="2903579"/>
+            <a:ext cx="3474720" cy="646331"/>
+          </a:xfrm>
+          <a:prstGeom prst="rect">
+            <a:avLst/>
+          </a:prstGeom>
+          <a:noFill/>
+        </p:spPr>
+        <p:txBody>
+          <a:bodyPr wrap="square">
+            <a:spAutoFit/>
+          </a:bodyPr>
+          <a:lstStyle/>
+          <a:p>
+            <a:r>
+              <a:rPr lang="en-US" altLang="ko-KR" sz="3600" spc="600" dirty="0"/>
+              <a:t>1010 1001 </a:t>
+            </a:r>
+          </a:p>
+        </p:txBody>
+      </p:sp>
+      <p:sp>
+        <p:nvSpPr>
+          <p:cNvPr id="12" name="TextBox 11">
+            <a:extLst>
+              <a:ext uri="{FF2B5EF4-FFF2-40B4-BE49-F238E27FC236}">
+                <a16:creationId xmlns:a16="http://schemas.microsoft.com/office/drawing/2014/main" id="{6B57DB4D-198B-4355-AEF7-4C0954BB7F45}"/>
+              </a:ext>
+            </a:extLst>
+          </p:cNvPr>
+          <p:cNvSpPr txBox="1"/>
+          <p:nvPr/>
+        </p:nvSpPr>
+        <p:spPr>
+          <a:xfrm>
+            <a:off x="2562860" y="3622824"/>
+            <a:ext cx="1651000" cy="646331"/>
+          </a:xfrm>
+          <a:prstGeom prst="rect">
+            <a:avLst/>
+          </a:prstGeom>
+          <a:noFill/>
+        </p:spPr>
+        <p:txBody>
+          <a:bodyPr wrap="square">
+            <a:spAutoFit/>
+          </a:bodyPr>
+          <a:lstStyle/>
+          <a:p>
+            <a:r>
+              <a:rPr lang="en-US" altLang="ko-KR" sz="3600" dirty="0"/>
+              <a:t>And</a:t>
+            </a:r>
+          </a:p>
+        </p:txBody>
+      </p:sp>
+    </p:spTree>
+    <p:extLst>
+      <p:ext uri="{BB962C8B-B14F-4D97-AF65-F5344CB8AC3E}">
+        <p14:creationId xmlns:p14="http://schemas.microsoft.com/office/powerpoint/2010/main" val="51924673"/>
+      </p:ext>
+    </p:extLst>
+  </p:cSld>
+  <p:clrMapOvr>
+    <a:masterClrMapping/>
+  </p:clrMapOvr>
+</p:sld>
+</file>
+
+<file path=ppt/slides/slide26.xml><?xml version="1.0" encoding="utf-8"?>
+<p:sld xmlns:a="http://schemas.openxmlformats.org/drawingml/2006/main" xmlns:r="http://schemas.openxmlformats.org/officeDocument/2006/relationships" xmlns:p="http://schemas.openxmlformats.org/presentationml/2006/main">
+  <p:cSld>
+    <p:spTree>
+      <p:nvGrpSpPr>
+        <p:cNvPr id="1" name=""/>
+        <p:cNvGrpSpPr/>
+        <p:nvPr/>
+      </p:nvGrpSpPr>
+      <p:grpSpPr>
+        <a:xfrm>
+          <a:off x="0" y="0"/>
+          <a:ext cx="0" cy="0"/>
+          <a:chOff x="0" y="0"/>
+          <a:chExt cx="0" cy="0"/>
+        </a:xfrm>
+      </p:grpSpPr>
+      <p:sp>
+        <p:nvSpPr>
+          <p:cNvPr id="2" name="제목 1">
+            <a:extLst>
+              <a:ext uri="{FF2B5EF4-FFF2-40B4-BE49-F238E27FC236}">
                 <a16:creationId xmlns:a16="http://schemas.microsoft.com/office/drawing/2014/main" id="{F6879927-84E0-4D4F-AE59-EAA0DBA338C5}"/>
               </a:ext>
             </a:extLst>
@@ -7333,7 +7662,7 @@
 </p:sld>
 </file>
 
-<file path=ppt/slides/slide25.xml><?xml version="1.0" encoding="utf-8"?>
+<file path=ppt/slides/slide27.xml><?xml version="1.0" encoding="utf-8"?>
 <p:sld xmlns:a="http://schemas.openxmlformats.org/drawingml/2006/main" xmlns:r="http://schemas.openxmlformats.org/officeDocument/2006/relationships" xmlns:p="http://schemas.openxmlformats.org/presentationml/2006/main">
   <p:cSld>
     <p:spTree>
@@ -7866,7 +8195,7 @@
           <p:cNvPr id="2" name="제목 1">
             <a:extLst>
               <a:ext uri="{FF2B5EF4-FFF2-40B4-BE49-F238E27FC236}">
-                <a16:creationId xmlns:a16="http://schemas.microsoft.com/office/drawing/2014/main" id="{BE3C729A-CFBE-4762-A3C9-04A30B8BCA90}"/>
+                <a16:creationId xmlns:a16="http://schemas.microsoft.com/office/drawing/2014/main" id="{4C4F0C87-CB56-424A-B217-214D33FAA65B}"/>
               </a:ext>
             </a:extLst>
           </p:cNvPr>
@@ -7883,22 +8212,22 @@
           <a:lstStyle/>
           <a:p>
             <a:r>
-              <a:rPr lang="en-US" altLang="ko-KR" dirty="0"/>
-              <a:t>10799 </a:t>
+              <a:rPr lang="ko-KR" altLang="en-US" dirty="0" err="1"/>
+              <a:t>에라토스테네스의</a:t>
             </a:r>
             <a:r>
               <a:rPr lang="ko-KR" altLang="en-US" dirty="0"/>
-              <a:t>쇠막대기</a:t>
+              <a:t> 체</a:t>
             </a:r>
           </a:p>
         </p:txBody>
       </p:sp>
       <p:pic>
         <p:nvPicPr>
-          <p:cNvPr id="5" name="내용 개체 틀 4">
+          <p:cNvPr id="15" name="내용 개체 틀 14">
             <a:extLst>
               <a:ext uri="{FF2B5EF4-FFF2-40B4-BE49-F238E27FC236}">
-                <a16:creationId xmlns:a16="http://schemas.microsoft.com/office/drawing/2014/main" id="{FF18A8AD-0630-4D05-BC94-4424E1FF488E}"/>
+                <a16:creationId xmlns:a16="http://schemas.microsoft.com/office/drawing/2014/main" id="{DE8E276D-1016-468F-A740-5FC7445E429B}"/>
               </a:ext>
             </a:extLst>
           </p:cNvPr>
@@ -7917,45 +8246,62 @@
         </p:blipFill>
         <p:spPr>
           <a:xfrm>
-            <a:off x="750698" y="1499616"/>
-            <a:ext cx="9724788" cy="5358384"/>
+            <a:off x="5366096" y="1761266"/>
+            <a:ext cx="7206013" cy="4238831"/>
           </a:xfrm>
         </p:spPr>
       </p:pic>
       <p:pic>
         <p:nvPicPr>
-          <p:cNvPr id="13" name="그림 12">
+          <p:cNvPr id="17" name="Picture 2">
             <a:extLst>
               <a:ext uri="{FF2B5EF4-FFF2-40B4-BE49-F238E27FC236}">
-                <a16:creationId xmlns:a16="http://schemas.microsoft.com/office/drawing/2014/main" id="{381D09B2-FD61-48C4-962F-BFA39B48D967}"/>
+                <a16:creationId xmlns:a16="http://schemas.microsoft.com/office/drawing/2014/main" id="{27D73400-AB47-4733-897F-D8B1C40B703F}"/>
               </a:ext>
             </a:extLst>
           </p:cNvPr>
           <p:cNvPicPr>
-            <a:picLocks noChangeAspect="1"/>
+            <a:picLocks noChangeAspect="1" noChangeArrowheads="1" noCrop="1"/>
           </p:cNvPicPr>
           <p:nvPr/>
         </p:nvPicPr>
         <p:blipFill>
-          <a:blip r:embed="rId3"/>
+          <a:blip r:embed="rId3">
+            <a:extLst>
+              <a:ext uri="{28A0092B-C50C-407E-A947-70E740481C1C}">
+                <a14:useLocalDpi xmlns:a14="http://schemas.microsoft.com/office/drawing/2010/main" val="0"/>
+              </a:ext>
+            </a:extLst>
+          </a:blip>
+          <a:srcRect/>
           <a:stretch>
             <a:fillRect/>
           </a:stretch>
         </p:blipFill>
-        <p:spPr>
-          <a:xfrm>
-            <a:off x="750698" y="683673"/>
-            <a:ext cx="2298587" cy="717804"/>
+        <p:spPr bwMode="auto">
+          <a:xfrm>
+            <a:off x="0" y="1761266"/>
+            <a:ext cx="5366096" cy="4449639"/>
           </a:xfrm>
           <a:prstGeom prst="rect">
             <a:avLst/>
           </a:prstGeom>
+          <a:noFill/>
+          <a:extLst>
+            <a:ext uri="{909E8E84-426E-40DD-AFC4-6F175D3DCCD1}">
+              <a14:hiddenFill xmlns:a14="http://schemas.microsoft.com/office/drawing/2010/main">
+                <a:solidFill>
+                  <a:srgbClr val="FFFFFF"/>
+                </a:solidFill>
+              </a14:hiddenFill>
+            </a:ext>
+          </a:extLst>
         </p:spPr>
       </p:pic>
     </p:spTree>
     <p:extLst>
       <p:ext uri="{BB962C8B-B14F-4D97-AF65-F5344CB8AC3E}">
-        <p14:creationId xmlns:p14="http://schemas.microsoft.com/office/powerpoint/2010/main" val="1006997065"/>
+        <p14:creationId xmlns:p14="http://schemas.microsoft.com/office/powerpoint/2010/main" val="2893475408"/>
       </p:ext>
     </p:extLst>
   </p:cSld>
@@ -7987,7 +8333,7 @@
           <p:cNvPr id="2" name="제목 1">
             <a:extLst>
               <a:ext uri="{FF2B5EF4-FFF2-40B4-BE49-F238E27FC236}">
-                <a16:creationId xmlns:a16="http://schemas.microsoft.com/office/drawing/2014/main" id="{C004C1E5-2DEB-4ACA-B5F8-7CF04871DDB3}"/>
+                <a16:creationId xmlns:a16="http://schemas.microsoft.com/office/drawing/2014/main" id="{C020B826-0F38-4F01-B676-950A9F56FE1F}"/>
               </a:ext>
             </a:extLst>
           </p:cNvPr>
@@ -8005,22 +8351,21 @@
           <a:p>
             <a:r>
               <a:rPr lang="en-US" altLang="ko-KR" dirty="0"/>
-              <a:t>5397 </a:t>
-            </a:r>
-            <a:r>
-              <a:rPr lang="ko-KR" altLang="en-US" dirty="0" err="1"/>
-              <a:t>키로거</a:t>
-            </a:r>
-            <a:endParaRPr lang="ko-KR" altLang="en-US" dirty="0"/>
+              <a:t>1966 </a:t>
+            </a:r>
+            <a:r>
+              <a:rPr lang="ko-KR" altLang="en-US" dirty="0"/>
+              <a:t>프린터 큐 </a:t>
+            </a:r>
           </a:p>
         </p:txBody>
       </p:sp>
       <p:pic>
         <p:nvPicPr>
-          <p:cNvPr id="5" name="내용 개체 틀 4">
+          <p:cNvPr id="7" name="내용 개체 틀 6">
             <a:extLst>
               <a:ext uri="{FF2B5EF4-FFF2-40B4-BE49-F238E27FC236}">
-                <a16:creationId xmlns:a16="http://schemas.microsoft.com/office/drawing/2014/main" id="{DCBF003D-8EFB-4DAE-B663-07929A880B99}"/>
+                <a16:creationId xmlns:a16="http://schemas.microsoft.com/office/drawing/2014/main" id="{902F404C-7592-4B36-B244-49610CA34C94}"/>
               </a:ext>
             </a:extLst>
           </p:cNvPr>
@@ -8030,33 +8375,6 @@
           <p:nvPr>
             <p:ph idx="1"/>
           </p:nvPr>
-        </p:nvPicPr>
-        <p:blipFill>
-          <a:blip r:embed="rId2"/>
-          <a:stretch>
-            <a:fillRect/>
-          </a:stretch>
-        </p:blipFill>
-        <p:spPr>
-          <a:xfrm>
-            <a:off x="204225" y="1499616"/>
-            <a:ext cx="9731230" cy="4525963"/>
-          </a:xfrm>
-        </p:spPr>
-      </p:pic>
-      <p:pic>
-        <p:nvPicPr>
-          <p:cNvPr id="7" name="그림 6">
-            <a:extLst>
-              <a:ext uri="{FF2B5EF4-FFF2-40B4-BE49-F238E27FC236}">
-                <a16:creationId xmlns:a16="http://schemas.microsoft.com/office/drawing/2014/main" id="{81F7C624-BD47-4213-9B70-44C571CF90E8}"/>
-              </a:ext>
-            </a:extLst>
-          </p:cNvPr>
-          <p:cNvPicPr>
-            <a:picLocks noChangeAspect="1"/>
-          </p:cNvPicPr>
-          <p:nvPr/>
         </p:nvPicPr>
         <p:blipFill>
           <a:blip r:embed="rId3"/>
@@ -8066,20 +8384,52 @@
         </p:blipFill>
         <p:spPr>
           <a:xfrm>
-            <a:off x="9935455" y="1499616"/>
-            <a:ext cx="1962424" cy="1819529"/>
+            <a:off x="0" y="1499616"/>
+            <a:ext cx="7524827" cy="6282559"/>
+          </a:xfrm>
+        </p:spPr>
+      </p:pic>
+      <p:sp>
+        <p:nvSpPr>
+          <p:cNvPr id="5" name="TextBox 4">
+            <a:extLst>
+              <a:ext uri="{FF2B5EF4-FFF2-40B4-BE49-F238E27FC236}">
+                <a16:creationId xmlns:a16="http://schemas.microsoft.com/office/drawing/2014/main" id="{15976F41-BF8F-4539-ACB2-5E258F117D5B}"/>
+              </a:ext>
+            </a:extLst>
+          </p:cNvPr>
+          <p:cNvSpPr txBox="1"/>
+          <p:nvPr/>
+        </p:nvSpPr>
+        <p:spPr>
+          <a:xfrm>
+            <a:off x="6695440" y="0"/>
+            <a:ext cx="6096000" cy="369332"/>
           </a:xfrm>
           <a:prstGeom prst="rect">
             <a:avLst/>
           </a:prstGeom>
-        </p:spPr>
-      </p:pic>
+          <a:noFill/>
+        </p:spPr>
+        <p:txBody>
+          <a:bodyPr wrap="square">
+            <a:spAutoFit/>
+          </a:bodyPr>
+          <a:lstStyle/>
+          <a:p>
+            <a:r>
+              <a:rPr lang="ko-KR" altLang="en-US" dirty="0"/>
+              <a:t>https://www.acmicpc.net/problem/1966</a:t>
+            </a:r>
+          </a:p>
+        </p:txBody>
+      </p:sp>
       <p:pic>
         <p:nvPicPr>
           <p:cNvPr id="9" name="그림 8">
             <a:extLst>
               <a:ext uri="{FF2B5EF4-FFF2-40B4-BE49-F238E27FC236}">
-                <a16:creationId xmlns:a16="http://schemas.microsoft.com/office/drawing/2014/main" id="{BB8EC77B-A300-4928-8015-80D648BBF494}"/>
+                <a16:creationId xmlns:a16="http://schemas.microsoft.com/office/drawing/2014/main" id="{878491A0-85EE-4A65-BB69-B3FB6B93EA60}"/>
               </a:ext>
             </a:extLst>
           </p:cNvPr>
@@ -8096,8 +8446,8 @@
         </p:blipFill>
         <p:spPr>
           <a:xfrm>
-            <a:off x="10030718" y="3319145"/>
-            <a:ext cx="1771897" cy="1514686"/>
+            <a:off x="7768512" y="1499616"/>
+            <a:ext cx="4707267" cy="2124454"/>
           </a:xfrm>
           <a:prstGeom prst="rect">
             <a:avLst/>
@@ -8107,7 +8457,7 @@
     </p:spTree>
     <p:extLst>
       <p:ext uri="{BB962C8B-B14F-4D97-AF65-F5344CB8AC3E}">
-        <p14:creationId xmlns:p14="http://schemas.microsoft.com/office/powerpoint/2010/main" val="109415466"/>
+        <p14:creationId xmlns:p14="http://schemas.microsoft.com/office/powerpoint/2010/main" val="149923507"/>
       </p:ext>
     </p:extLst>
   </p:cSld>
@@ -8139,7 +8489,7 @@
           <p:cNvPr id="2" name="제목 1">
             <a:extLst>
               <a:ext uri="{FF2B5EF4-FFF2-40B4-BE49-F238E27FC236}">
-                <a16:creationId xmlns:a16="http://schemas.microsoft.com/office/drawing/2014/main" id="{0E8EE3F5-6CBC-4762-9F67-783EA64848E1}"/>
+                <a16:creationId xmlns:a16="http://schemas.microsoft.com/office/drawing/2014/main" id="{BE3C729A-CFBE-4762-A3C9-04A30B8BCA90}"/>
               </a:ext>
             </a:extLst>
           </p:cNvPr>
@@ -8156,89 +8506,51 @@
           <a:lstStyle/>
           <a:p>
             <a:r>
-              <a:rPr lang="en-US" altLang="ko-KR" dirty="0" err="1"/>
-              <a:t>QnA</a:t>
-            </a:r>
-            <a:endParaRPr lang="ko-KR" altLang="en-US" dirty="0"/>
+              <a:rPr lang="en-US" altLang="ko-KR" dirty="0"/>
+              <a:t>10799 </a:t>
+            </a:r>
+            <a:r>
+              <a:rPr lang="ko-KR" altLang="en-US" dirty="0"/>
+              <a:t>쇠막대기</a:t>
+            </a:r>
           </a:p>
         </p:txBody>
       </p:sp>
       <p:pic>
         <p:nvPicPr>
-          <p:cNvPr id="13" name="그림 12" descr="텍스트, 스크린샷, 모니터, 검은색이(가) 표시된 사진&#10;&#10;자동 생성된 설명">
+          <p:cNvPr id="5" name="내용 개체 틀 4">
             <a:extLst>
               <a:ext uri="{FF2B5EF4-FFF2-40B4-BE49-F238E27FC236}">
-                <a16:creationId xmlns:a16="http://schemas.microsoft.com/office/drawing/2014/main" id="{381BEB9C-5B8D-49F9-B296-81B48C596FF3}"/>
+                <a16:creationId xmlns:a16="http://schemas.microsoft.com/office/drawing/2014/main" id="{FF18A8AD-0630-4D05-BC94-4424E1FF488E}"/>
               </a:ext>
             </a:extLst>
           </p:cNvPr>
           <p:cNvPicPr>
-            <a:picLocks noChangeAspect="1"/>
+            <a:picLocks noGrp="1" noChangeAspect="1"/>
           </p:cNvPicPr>
-          <p:nvPr/>
+          <p:nvPr>
+            <p:ph idx="1"/>
+          </p:nvPr>
         </p:nvPicPr>
-        <p:blipFill rotWithShape="1">
-          <a:blip r:embed="rId2">
-            <a:extLst>
-              <a:ext uri="{28A0092B-C50C-407E-A947-70E740481C1C}">
-                <a14:useLocalDpi xmlns:a14="http://schemas.microsoft.com/office/drawing/2010/main" val="0"/>
-              </a:ext>
-            </a:extLst>
-          </a:blip>
-          <a:srcRect b="28366"/>
-          <a:stretch/>
+        <p:blipFill>
+          <a:blip r:embed="rId2"/>
+          <a:stretch>
+            <a:fillRect/>
+          </a:stretch>
         </p:blipFill>
         <p:spPr>
           <a:xfrm>
-            <a:off x="609600" y="1581060"/>
-            <a:ext cx="3248526" cy="4912659"/>
-          </a:xfrm>
-          <a:prstGeom prst="rect">
-            <a:avLst/>
-          </a:prstGeom>
+            <a:off x="750698" y="1499616"/>
+            <a:ext cx="9724788" cy="5358384"/>
+          </a:xfrm>
         </p:spPr>
       </p:pic>
       <p:pic>
         <p:nvPicPr>
-          <p:cNvPr id="15" name="그림 14" descr="텍스트이(가) 표시된 사진&#10;&#10;자동 생성된 설명">
+          <p:cNvPr id="13" name="그림 12">
             <a:extLst>
               <a:ext uri="{FF2B5EF4-FFF2-40B4-BE49-F238E27FC236}">
-                <a16:creationId xmlns:a16="http://schemas.microsoft.com/office/drawing/2014/main" id="{EB668169-4AFB-4BCE-A924-01B5A606DFCC}"/>
-              </a:ext>
-            </a:extLst>
-          </p:cNvPr>
-          <p:cNvPicPr>
-            <a:picLocks noChangeAspect="1"/>
-          </p:cNvPicPr>
-          <p:nvPr/>
-        </p:nvPicPr>
-        <p:blipFill rotWithShape="1">
-          <a:blip r:embed="rId3">
-            <a:extLst>
-              <a:ext uri="{28A0092B-C50C-407E-A947-70E740481C1C}">
-                <a14:useLocalDpi xmlns:a14="http://schemas.microsoft.com/office/drawing/2010/main" val="0"/>
-              </a:ext>
-            </a:extLst>
-          </a:blip>
-          <a:srcRect b="38135"/>
-          <a:stretch/>
-        </p:blipFill>
-        <p:spPr>
-          <a:xfrm>
-            <a:off x="4220126" y="1581060"/>
-            <a:ext cx="3248526" cy="4242726"/>
-          </a:xfrm>
-          <a:prstGeom prst="rect">
-            <a:avLst/>
-          </a:prstGeom>
-        </p:spPr>
-      </p:pic>
-      <p:pic>
-        <p:nvPicPr>
-          <p:cNvPr id="19" name="그림 18">
-            <a:extLst>
-              <a:ext uri="{FF2B5EF4-FFF2-40B4-BE49-F238E27FC236}">
-                <a16:creationId xmlns:a16="http://schemas.microsoft.com/office/drawing/2014/main" id="{A5AE91A5-D909-4B21-9BAD-5CFF9DCDE9A7}"/>
+                <a16:creationId xmlns:a16="http://schemas.microsoft.com/office/drawing/2014/main" id="{381D09B2-FD61-48C4-962F-BFA39B48D967}"/>
               </a:ext>
             </a:extLst>
           </p:cNvPr>
@@ -8248,175 +8560,25 @@
           <p:nvPr/>
         </p:nvPicPr>
         <p:blipFill>
-          <a:blip r:embed="rId4"/>
+          <a:blip r:embed="rId3"/>
           <a:stretch>
             <a:fillRect/>
           </a:stretch>
         </p:blipFill>
         <p:spPr>
           <a:xfrm>
-            <a:off x="7830652" y="1722491"/>
-            <a:ext cx="4229690" cy="2314898"/>
+            <a:off x="750698" y="683673"/>
+            <a:ext cx="2298587" cy="717804"/>
           </a:xfrm>
           <a:prstGeom prst="rect">
             <a:avLst/>
           </a:prstGeom>
         </p:spPr>
       </p:pic>
-      <p:sp>
-        <p:nvSpPr>
-          <p:cNvPr id="20" name="사각형: 둥근 모서리 19">
-            <a:extLst>
-              <a:ext uri="{FF2B5EF4-FFF2-40B4-BE49-F238E27FC236}">
-                <a16:creationId xmlns:a16="http://schemas.microsoft.com/office/drawing/2014/main" id="{6071E4A8-C98E-413C-9D3D-999E40C6A209}"/>
-              </a:ext>
-            </a:extLst>
-          </p:cNvPr>
-          <p:cNvSpPr/>
-          <p:nvPr/>
-        </p:nvSpPr>
-        <p:spPr>
-          <a:xfrm>
-            <a:off x="6949397" y="4706471"/>
-            <a:ext cx="466837" cy="331694"/>
-          </a:xfrm>
-          <a:prstGeom prst="roundRect">
-            <a:avLst/>
-          </a:prstGeom>
-        </p:spPr>
-        <p:style>
-          <a:lnRef idx="2">
-            <a:schemeClr val="accent4">
-              <a:shade val="50000"/>
-            </a:schemeClr>
-          </a:lnRef>
-          <a:fillRef idx="1">
-            <a:schemeClr val="accent4"/>
-          </a:fillRef>
-          <a:effectRef idx="0">
-            <a:schemeClr val="accent4"/>
-          </a:effectRef>
-          <a:fontRef idx="minor">
-            <a:schemeClr val="lt1"/>
-          </a:fontRef>
-        </p:style>
-        <p:txBody>
-          <a:bodyPr rtlCol="0" anchor="ctr"/>
-          <a:lstStyle/>
-          <a:p>
-            <a:pPr algn="ctr"/>
-            <a:r>
-              <a:rPr lang="en-US" altLang="ko-KR" b="1" dirty="0"/>
-              <a:t>T</a:t>
-            </a:r>
-            <a:endParaRPr lang="ko-KR" altLang="en-US" b="1" dirty="0"/>
-          </a:p>
-        </p:txBody>
-      </p:sp>
-      <p:sp>
-        <p:nvSpPr>
-          <p:cNvPr id="21" name="사각형: 둥근 모서리 20">
-            <a:extLst>
-              <a:ext uri="{FF2B5EF4-FFF2-40B4-BE49-F238E27FC236}">
-                <a16:creationId xmlns:a16="http://schemas.microsoft.com/office/drawing/2014/main" id="{AA4E01C9-B363-4446-B828-C2294B6C404C}"/>
-              </a:ext>
-            </a:extLst>
-          </p:cNvPr>
-          <p:cNvSpPr/>
-          <p:nvPr/>
-        </p:nvSpPr>
-        <p:spPr>
-          <a:xfrm>
-            <a:off x="6949396" y="5396753"/>
-            <a:ext cx="466837" cy="331694"/>
-          </a:xfrm>
-          <a:prstGeom prst="roundRect">
-            <a:avLst/>
-          </a:prstGeom>
-        </p:spPr>
-        <p:style>
-          <a:lnRef idx="2">
-            <a:schemeClr val="accent4">
-              <a:shade val="50000"/>
-            </a:schemeClr>
-          </a:lnRef>
-          <a:fillRef idx="1">
-            <a:schemeClr val="accent4"/>
-          </a:fillRef>
-          <a:effectRef idx="0">
-            <a:schemeClr val="accent4"/>
-          </a:effectRef>
-          <a:fontRef idx="minor">
-            <a:schemeClr val="lt1"/>
-          </a:fontRef>
-        </p:style>
-        <p:txBody>
-          <a:bodyPr rtlCol="0" anchor="ctr"/>
-          <a:lstStyle/>
-          <a:p>
-            <a:pPr algn="ctr"/>
-            <a:r>
-              <a:rPr lang="en-US" altLang="ko-KR" b="1" dirty="0"/>
-              <a:t>T</a:t>
-            </a:r>
-            <a:endParaRPr lang="ko-KR" altLang="en-US" b="1" dirty="0"/>
-          </a:p>
-        </p:txBody>
-      </p:sp>
-      <p:sp>
-        <p:nvSpPr>
-          <p:cNvPr id="22" name="사각형: 둥근 모서리 21">
-            <a:extLst>
-              <a:ext uri="{FF2B5EF4-FFF2-40B4-BE49-F238E27FC236}">
-                <a16:creationId xmlns:a16="http://schemas.microsoft.com/office/drawing/2014/main" id="{667B2FED-1CD7-4A6D-865F-142D389184CA}"/>
-              </a:ext>
-            </a:extLst>
-          </p:cNvPr>
-          <p:cNvSpPr/>
-          <p:nvPr/>
-        </p:nvSpPr>
-        <p:spPr>
-          <a:xfrm>
-            <a:off x="2933209" y="5986810"/>
-            <a:ext cx="466837" cy="331694"/>
-          </a:xfrm>
-          <a:prstGeom prst="roundRect">
-            <a:avLst/>
-          </a:prstGeom>
-        </p:spPr>
-        <p:style>
-          <a:lnRef idx="2">
-            <a:schemeClr val="accent4">
-              <a:shade val="50000"/>
-            </a:schemeClr>
-          </a:lnRef>
-          <a:fillRef idx="1">
-            <a:schemeClr val="accent4"/>
-          </a:fillRef>
-          <a:effectRef idx="0">
-            <a:schemeClr val="accent4"/>
-          </a:effectRef>
-          <a:fontRef idx="minor">
-            <a:schemeClr val="lt1"/>
-          </a:fontRef>
-        </p:style>
-        <p:txBody>
-          <a:bodyPr rtlCol="0" anchor="ctr"/>
-          <a:lstStyle/>
-          <a:p>
-            <a:pPr algn="ctr"/>
-            <a:r>
-              <a:rPr lang="en-US" altLang="ko-KR" b="1" dirty="0"/>
-              <a:t>F</a:t>
-            </a:r>
-            <a:endParaRPr lang="ko-KR" altLang="en-US" b="1" dirty="0"/>
-          </a:p>
-        </p:txBody>
-      </p:sp>
     </p:spTree>
     <p:extLst>
       <p:ext uri="{BB962C8B-B14F-4D97-AF65-F5344CB8AC3E}">
-        <p14:creationId xmlns:p14="http://schemas.microsoft.com/office/powerpoint/2010/main" val="501000901"/>
+        <p14:creationId xmlns:p14="http://schemas.microsoft.com/office/powerpoint/2010/main" val="1006997065"/>
       </p:ext>
     </p:extLst>
   </p:cSld>
@@ -8448,7 +8610,7 @@
           <p:cNvPr id="2" name="제목 1">
             <a:extLst>
               <a:ext uri="{FF2B5EF4-FFF2-40B4-BE49-F238E27FC236}">
-                <a16:creationId xmlns:a16="http://schemas.microsoft.com/office/drawing/2014/main" id="{7B9F0053-8921-4C58-A9DD-F775986D5139}"/>
+                <a16:creationId xmlns:a16="http://schemas.microsoft.com/office/drawing/2014/main" id="{C004C1E5-2DEB-4ACA-B5F8-7CF04871DDB3}"/>
               </a:ext>
             </a:extLst>
           </p:cNvPr>
@@ -8465,90 +8627,110 @@
           <a:lstStyle/>
           <a:p>
             <a:r>
-              <a:rPr lang="ko-KR" altLang="en-US" dirty="0"/>
-              <a:t>목차</a:t>
-            </a:r>
-          </a:p>
-        </p:txBody>
-      </p:sp>
-      <p:sp>
-        <p:nvSpPr>
-          <p:cNvPr id="3" name="내용 개체 틀 2">
+              <a:rPr lang="en-US" altLang="ko-KR" dirty="0"/>
+              <a:t>5397 </a:t>
+            </a:r>
+            <a:r>
+              <a:rPr lang="ko-KR" altLang="en-US" dirty="0" err="1"/>
+              <a:t>키로거</a:t>
+            </a:r>
+            <a:endParaRPr lang="ko-KR" altLang="en-US" dirty="0"/>
+          </a:p>
+        </p:txBody>
+      </p:sp>
+      <p:pic>
+        <p:nvPicPr>
+          <p:cNvPr id="5" name="내용 개체 틀 4">
             <a:extLst>
               <a:ext uri="{FF2B5EF4-FFF2-40B4-BE49-F238E27FC236}">
-                <a16:creationId xmlns:a16="http://schemas.microsoft.com/office/drawing/2014/main" id="{787FC13A-35DA-415B-BDF9-4C008161B491}"/>
+                <a16:creationId xmlns:a16="http://schemas.microsoft.com/office/drawing/2014/main" id="{DCBF003D-8EFB-4DAE-B663-07929A880B99}"/>
               </a:ext>
             </a:extLst>
           </p:cNvPr>
-          <p:cNvSpPr>
-            <a:spLocks noGrp="1"/>
-          </p:cNvSpPr>
+          <p:cNvPicPr>
+            <a:picLocks noGrp="1" noChangeAspect="1"/>
+          </p:cNvPicPr>
           <p:nvPr>
             <p:ph idx="1"/>
           </p:nvPr>
-        </p:nvSpPr>
-        <p:spPr/>
-        <p:txBody>
-          <a:bodyPr/>
-          <a:lstStyle/>
-          <a:p>
-            <a:r>
-              <a:rPr lang="en-US" altLang="ko-KR" dirty="0"/>
-              <a:t> </a:t>
-            </a:r>
-            <a:r>
-              <a:rPr lang="ko-KR" altLang="en-US" dirty="0"/>
-              <a:t>완전탐색</a:t>
-            </a:r>
-            <a:endParaRPr lang="en-US" altLang="ko-KR" dirty="0"/>
-          </a:p>
-          <a:p>
-            <a:r>
-              <a:rPr lang="en-US" altLang="ko-KR" dirty="0"/>
-              <a:t> Binary Search</a:t>
-            </a:r>
-          </a:p>
-          <a:p>
-            <a:r>
-              <a:rPr lang="ko-KR" altLang="en-US" dirty="0"/>
-              <a:t> </a:t>
-            </a:r>
-            <a:r>
-              <a:rPr lang="en-US" altLang="ko-KR" dirty="0"/>
-              <a:t>GCD, LCM </a:t>
-            </a:r>
-          </a:p>
-          <a:p>
-            <a:r>
-              <a:rPr lang="en-US" altLang="ko-KR" dirty="0"/>
-              <a:t> </a:t>
-            </a:r>
-            <a:r>
-              <a:rPr lang="ko-KR" altLang="en-US" dirty="0"/>
-              <a:t>유클리드 </a:t>
-            </a:r>
-            <a:r>
-              <a:rPr lang="ko-KR" altLang="en-US" dirty="0" err="1"/>
-              <a:t>호제법</a:t>
-            </a:r>
-            <a:endParaRPr lang="en-US" altLang="ko-KR" dirty="0"/>
-          </a:p>
-          <a:p>
-            <a:r>
-              <a:rPr lang="en-US" altLang="ko-KR" dirty="0"/>
-              <a:t> Bit </a:t>
-            </a:r>
-            <a:r>
-              <a:rPr lang="ko-KR" altLang="en-US" dirty="0"/>
-              <a:t>연산</a:t>
-            </a:r>
-          </a:p>
-        </p:txBody>
-      </p:sp>
+        </p:nvPicPr>
+        <p:blipFill>
+          <a:blip r:embed="rId2"/>
+          <a:stretch>
+            <a:fillRect/>
+          </a:stretch>
+        </p:blipFill>
+        <p:spPr>
+          <a:xfrm>
+            <a:off x="204225" y="1499616"/>
+            <a:ext cx="9731230" cy="4525963"/>
+          </a:xfrm>
+        </p:spPr>
+      </p:pic>
+      <p:pic>
+        <p:nvPicPr>
+          <p:cNvPr id="7" name="그림 6">
+            <a:extLst>
+              <a:ext uri="{FF2B5EF4-FFF2-40B4-BE49-F238E27FC236}">
+                <a16:creationId xmlns:a16="http://schemas.microsoft.com/office/drawing/2014/main" id="{81F7C624-BD47-4213-9B70-44C571CF90E8}"/>
+              </a:ext>
+            </a:extLst>
+          </p:cNvPr>
+          <p:cNvPicPr>
+            <a:picLocks noChangeAspect="1"/>
+          </p:cNvPicPr>
+          <p:nvPr/>
+        </p:nvPicPr>
+        <p:blipFill>
+          <a:blip r:embed="rId3"/>
+          <a:stretch>
+            <a:fillRect/>
+          </a:stretch>
+        </p:blipFill>
+        <p:spPr>
+          <a:xfrm>
+            <a:off x="9935455" y="1499616"/>
+            <a:ext cx="1962424" cy="1819529"/>
+          </a:xfrm>
+          <a:prstGeom prst="rect">
+            <a:avLst/>
+          </a:prstGeom>
+        </p:spPr>
+      </p:pic>
+      <p:pic>
+        <p:nvPicPr>
+          <p:cNvPr id="9" name="그림 8">
+            <a:extLst>
+              <a:ext uri="{FF2B5EF4-FFF2-40B4-BE49-F238E27FC236}">
+                <a16:creationId xmlns:a16="http://schemas.microsoft.com/office/drawing/2014/main" id="{BB8EC77B-A300-4928-8015-80D648BBF494}"/>
+              </a:ext>
+            </a:extLst>
+          </p:cNvPr>
+          <p:cNvPicPr>
+            <a:picLocks noChangeAspect="1"/>
+          </p:cNvPicPr>
+          <p:nvPr/>
+        </p:nvPicPr>
+        <p:blipFill>
+          <a:blip r:embed="rId4"/>
+          <a:stretch>
+            <a:fillRect/>
+          </a:stretch>
+        </p:blipFill>
+        <p:spPr>
+          <a:xfrm>
+            <a:off x="10030718" y="3319145"/>
+            <a:ext cx="1771897" cy="1514686"/>
+          </a:xfrm>
+          <a:prstGeom prst="rect">
+            <a:avLst/>
+          </a:prstGeom>
+        </p:spPr>
+      </p:pic>
     </p:spTree>
     <p:extLst>
       <p:ext uri="{BB962C8B-B14F-4D97-AF65-F5344CB8AC3E}">
-        <p14:creationId xmlns:p14="http://schemas.microsoft.com/office/powerpoint/2010/main" val="839757777"/>
+        <p14:creationId xmlns:p14="http://schemas.microsoft.com/office/powerpoint/2010/main" val="109415466"/>
       </p:ext>
     </p:extLst>
   </p:cSld>
@@ -8580,7 +8762,7 @@
           <p:cNvPr id="2" name="제목 1">
             <a:extLst>
               <a:ext uri="{FF2B5EF4-FFF2-40B4-BE49-F238E27FC236}">
-                <a16:creationId xmlns:a16="http://schemas.microsoft.com/office/drawing/2014/main" id="{22A6C3E0-148D-4BB6-BC5C-A08C4A4DBD13}"/>
+                <a16:creationId xmlns:a16="http://schemas.microsoft.com/office/drawing/2014/main" id="{0E8EE3F5-6CBC-4762-9F67-783EA64848E1}"/>
               </a:ext>
             </a:extLst>
           </p:cNvPr>
@@ -8597,62 +8779,267 @@
           <a:lstStyle/>
           <a:p>
             <a:r>
-              <a:rPr lang="ko-KR" altLang="en-US" dirty="0"/>
-              <a:t>완전탐색</a:t>
-            </a:r>
-          </a:p>
-        </p:txBody>
-      </p:sp>
-      <p:sp>
-        <p:nvSpPr>
-          <p:cNvPr id="3" name="내용 개체 틀 2">
+              <a:rPr lang="en-US" altLang="ko-KR" dirty="0" err="1"/>
+              <a:t>QnA</a:t>
+            </a:r>
+            <a:endParaRPr lang="ko-KR" altLang="en-US" dirty="0"/>
+          </a:p>
+        </p:txBody>
+      </p:sp>
+      <p:pic>
+        <p:nvPicPr>
+          <p:cNvPr id="13" name="그림 12" descr="텍스트, 스크린샷, 모니터, 검은색이(가) 표시된 사진&#10;&#10;자동 생성된 설명">
             <a:extLst>
               <a:ext uri="{FF2B5EF4-FFF2-40B4-BE49-F238E27FC236}">
-                <a16:creationId xmlns:a16="http://schemas.microsoft.com/office/drawing/2014/main" id="{B4D45DC8-0C7F-4DD0-A5B3-F208B1718596}"/>
+                <a16:creationId xmlns:a16="http://schemas.microsoft.com/office/drawing/2014/main" id="{381BEB9C-5B8D-49F9-B296-81B48C596FF3}"/>
               </a:ext>
             </a:extLst>
           </p:cNvPr>
-          <p:cNvSpPr>
-            <a:spLocks noGrp="1"/>
-          </p:cNvSpPr>
-          <p:nvPr>
-            <p:ph idx="1"/>
-          </p:nvPr>
-        </p:nvSpPr>
-        <p:spPr/>
-        <p:txBody>
-          <a:bodyPr/>
-          <a:lstStyle/>
-          <a:p>
-            <a:r>
-              <a:rPr lang="ko-KR" altLang="en-US" dirty="0"/>
-              <a:t>단순하게 모든 경우의 수를 확인해보는 기법</a:t>
-            </a:r>
-            <a:r>
-              <a:rPr lang="en-US" altLang="ko-KR" dirty="0"/>
-              <a:t>!</a:t>
-            </a:r>
-          </a:p>
-          <a:p>
-            <a:endParaRPr lang="en-US" altLang="ko-KR" dirty="0"/>
-          </a:p>
-          <a:p>
-            <a:r>
-              <a:rPr lang="ko-KR" altLang="en-US" dirty="0"/>
-              <a:t>데이터의 수와 직결되기 때문에 효율성을 위해서는 거의 사용하지 않으나 기본중의 기본 </a:t>
-            </a:r>
-            <a:r>
-              <a:rPr lang="en-US" altLang="ko-KR" dirty="0"/>
-              <a:t>!</a:t>
-            </a:r>
-            <a:endParaRPr lang="ko-KR" altLang="en-US" dirty="0"/>
+          <p:cNvPicPr>
+            <a:picLocks noChangeAspect="1"/>
+          </p:cNvPicPr>
+          <p:nvPr/>
+        </p:nvPicPr>
+        <p:blipFill rotWithShape="1">
+          <a:blip r:embed="rId2">
+            <a:extLst>
+              <a:ext uri="{28A0092B-C50C-407E-A947-70E740481C1C}">
+                <a14:useLocalDpi xmlns:a14="http://schemas.microsoft.com/office/drawing/2010/main" val="0"/>
+              </a:ext>
+            </a:extLst>
+          </a:blip>
+          <a:srcRect b="28366"/>
+          <a:stretch/>
+        </p:blipFill>
+        <p:spPr>
+          <a:xfrm>
+            <a:off x="609600" y="1581060"/>
+            <a:ext cx="3248526" cy="4912659"/>
+          </a:xfrm>
+          <a:prstGeom prst="rect">
+            <a:avLst/>
+          </a:prstGeom>
+        </p:spPr>
+      </p:pic>
+      <p:pic>
+        <p:nvPicPr>
+          <p:cNvPr id="15" name="그림 14" descr="텍스트이(가) 표시된 사진&#10;&#10;자동 생성된 설명">
+            <a:extLst>
+              <a:ext uri="{FF2B5EF4-FFF2-40B4-BE49-F238E27FC236}">
+                <a16:creationId xmlns:a16="http://schemas.microsoft.com/office/drawing/2014/main" id="{EB668169-4AFB-4BCE-A924-01B5A606DFCC}"/>
+              </a:ext>
+            </a:extLst>
+          </p:cNvPr>
+          <p:cNvPicPr>
+            <a:picLocks noChangeAspect="1"/>
+          </p:cNvPicPr>
+          <p:nvPr/>
+        </p:nvPicPr>
+        <p:blipFill rotWithShape="1">
+          <a:blip r:embed="rId3">
+            <a:extLst>
+              <a:ext uri="{28A0092B-C50C-407E-A947-70E740481C1C}">
+                <a14:useLocalDpi xmlns:a14="http://schemas.microsoft.com/office/drawing/2010/main" val="0"/>
+              </a:ext>
+            </a:extLst>
+          </a:blip>
+          <a:srcRect b="38135"/>
+          <a:stretch/>
+        </p:blipFill>
+        <p:spPr>
+          <a:xfrm>
+            <a:off x="4220126" y="1581060"/>
+            <a:ext cx="3248526" cy="4242726"/>
+          </a:xfrm>
+          <a:prstGeom prst="rect">
+            <a:avLst/>
+          </a:prstGeom>
+        </p:spPr>
+      </p:pic>
+      <p:pic>
+        <p:nvPicPr>
+          <p:cNvPr id="19" name="그림 18">
+            <a:extLst>
+              <a:ext uri="{FF2B5EF4-FFF2-40B4-BE49-F238E27FC236}">
+                <a16:creationId xmlns:a16="http://schemas.microsoft.com/office/drawing/2014/main" id="{A5AE91A5-D909-4B21-9BAD-5CFF9DCDE9A7}"/>
+              </a:ext>
+            </a:extLst>
+          </p:cNvPr>
+          <p:cNvPicPr>
+            <a:picLocks noChangeAspect="1"/>
+          </p:cNvPicPr>
+          <p:nvPr/>
+        </p:nvPicPr>
+        <p:blipFill>
+          <a:blip r:embed="rId4"/>
+          <a:stretch>
+            <a:fillRect/>
+          </a:stretch>
+        </p:blipFill>
+        <p:spPr>
+          <a:xfrm>
+            <a:off x="7830652" y="1722491"/>
+            <a:ext cx="4229690" cy="2314898"/>
+          </a:xfrm>
+          <a:prstGeom prst="rect">
+            <a:avLst/>
+          </a:prstGeom>
+        </p:spPr>
+      </p:pic>
+      <p:sp>
+        <p:nvSpPr>
+          <p:cNvPr id="20" name="사각형: 둥근 모서리 19">
+            <a:extLst>
+              <a:ext uri="{FF2B5EF4-FFF2-40B4-BE49-F238E27FC236}">
+                <a16:creationId xmlns:a16="http://schemas.microsoft.com/office/drawing/2014/main" id="{6071E4A8-C98E-413C-9D3D-999E40C6A209}"/>
+              </a:ext>
+            </a:extLst>
+          </p:cNvPr>
+          <p:cNvSpPr/>
+          <p:nvPr/>
+        </p:nvSpPr>
+        <p:spPr>
+          <a:xfrm>
+            <a:off x="6949397" y="4706471"/>
+            <a:ext cx="466837" cy="331694"/>
+          </a:xfrm>
+          <a:prstGeom prst="roundRect">
+            <a:avLst/>
+          </a:prstGeom>
+        </p:spPr>
+        <p:style>
+          <a:lnRef idx="2">
+            <a:schemeClr val="accent4">
+              <a:shade val="50000"/>
+            </a:schemeClr>
+          </a:lnRef>
+          <a:fillRef idx="1">
+            <a:schemeClr val="accent4"/>
+          </a:fillRef>
+          <a:effectRef idx="0">
+            <a:schemeClr val="accent4"/>
+          </a:effectRef>
+          <a:fontRef idx="minor">
+            <a:schemeClr val="lt1"/>
+          </a:fontRef>
+        </p:style>
+        <p:txBody>
+          <a:bodyPr rtlCol="0" anchor="ctr"/>
+          <a:lstStyle/>
+          <a:p>
+            <a:pPr algn="ctr"/>
+            <a:r>
+              <a:rPr lang="en-US" altLang="ko-KR" b="1" dirty="0"/>
+              <a:t>T</a:t>
+            </a:r>
+            <a:endParaRPr lang="ko-KR" altLang="en-US" b="1" dirty="0"/>
+          </a:p>
+        </p:txBody>
+      </p:sp>
+      <p:sp>
+        <p:nvSpPr>
+          <p:cNvPr id="21" name="사각형: 둥근 모서리 20">
+            <a:extLst>
+              <a:ext uri="{FF2B5EF4-FFF2-40B4-BE49-F238E27FC236}">
+                <a16:creationId xmlns:a16="http://schemas.microsoft.com/office/drawing/2014/main" id="{AA4E01C9-B363-4446-B828-C2294B6C404C}"/>
+              </a:ext>
+            </a:extLst>
+          </p:cNvPr>
+          <p:cNvSpPr/>
+          <p:nvPr/>
+        </p:nvSpPr>
+        <p:spPr>
+          <a:xfrm>
+            <a:off x="6949396" y="5396753"/>
+            <a:ext cx="466837" cy="331694"/>
+          </a:xfrm>
+          <a:prstGeom prst="roundRect">
+            <a:avLst/>
+          </a:prstGeom>
+        </p:spPr>
+        <p:style>
+          <a:lnRef idx="2">
+            <a:schemeClr val="accent4">
+              <a:shade val="50000"/>
+            </a:schemeClr>
+          </a:lnRef>
+          <a:fillRef idx="1">
+            <a:schemeClr val="accent4"/>
+          </a:fillRef>
+          <a:effectRef idx="0">
+            <a:schemeClr val="accent4"/>
+          </a:effectRef>
+          <a:fontRef idx="minor">
+            <a:schemeClr val="lt1"/>
+          </a:fontRef>
+        </p:style>
+        <p:txBody>
+          <a:bodyPr rtlCol="0" anchor="ctr"/>
+          <a:lstStyle/>
+          <a:p>
+            <a:pPr algn="ctr"/>
+            <a:r>
+              <a:rPr lang="en-US" altLang="ko-KR" b="1" dirty="0"/>
+              <a:t>T</a:t>
+            </a:r>
+            <a:endParaRPr lang="ko-KR" altLang="en-US" b="1" dirty="0"/>
+          </a:p>
+        </p:txBody>
+      </p:sp>
+      <p:sp>
+        <p:nvSpPr>
+          <p:cNvPr id="22" name="사각형: 둥근 모서리 21">
+            <a:extLst>
+              <a:ext uri="{FF2B5EF4-FFF2-40B4-BE49-F238E27FC236}">
+                <a16:creationId xmlns:a16="http://schemas.microsoft.com/office/drawing/2014/main" id="{667B2FED-1CD7-4A6D-865F-142D389184CA}"/>
+              </a:ext>
+            </a:extLst>
+          </p:cNvPr>
+          <p:cNvSpPr/>
+          <p:nvPr/>
+        </p:nvSpPr>
+        <p:spPr>
+          <a:xfrm>
+            <a:off x="2933209" y="5986810"/>
+            <a:ext cx="466837" cy="331694"/>
+          </a:xfrm>
+          <a:prstGeom prst="roundRect">
+            <a:avLst/>
+          </a:prstGeom>
+        </p:spPr>
+        <p:style>
+          <a:lnRef idx="2">
+            <a:schemeClr val="accent4">
+              <a:shade val="50000"/>
+            </a:schemeClr>
+          </a:lnRef>
+          <a:fillRef idx="1">
+            <a:schemeClr val="accent4"/>
+          </a:fillRef>
+          <a:effectRef idx="0">
+            <a:schemeClr val="accent4"/>
+          </a:effectRef>
+          <a:fontRef idx="minor">
+            <a:schemeClr val="lt1"/>
+          </a:fontRef>
+        </p:style>
+        <p:txBody>
+          <a:bodyPr rtlCol="0" anchor="ctr"/>
+          <a:lstStyle/>
+          <a:p>
+            <a:pPr algn="ctr"/>
+            <a:r>
+              <a:rPr lang="en-US" altLang="ko-KR" b="1" dirty="0"/>
+              <a:t>F</a:t>
+            </a:r>
+            <a:endParaRPr lang="ko-KR" altLang="en-US" b="1" dirty="0"/>
           </a:p>
         </p:txBody>
       </p:sp>
     </p:spTree>
     <p:extLst>
       <p:ext uri="{BB962C8B-B14F-4D97-AF65-F5344CB8AC3E}">
-        <p14:creationId xmlns:p14="http://schemas.microsoft.com/office/powerpoint/2010/main" val="712997102"/>
+        <p14:creationId xmlns:p14="http://schemas.microsoft.com/office/powerpoint/2010/main" val="501000901"/>
       </p:ext>
     </p:extLst>
   </p:cSld>
@@ -8679,39 +9066,112 @@
           <a:chExt cx="0" cy="0"/>
         </a:xfrm>
       </p:grpSpPr>
-      <p:pic>
-        <p:nvPicPr>
-          <p:cNvPr id="5" name="내용 개체 틀 4">
+      <p:sp>
+        <p:nvSpPr>
+          <p:cNvPr id="2" name="제목 1">
             <a:extLst>
               <a:ext uri="{FF2B5EF4-FFF2-40B4-BE49-F238E27FC236}">
-                <a16:creationId xmlns:a16="http://schemas.microsoft.com/office/drawing/2014/main" id="{0B60445E-ABB8-4E60-B6F5-07F4183689C6}"/>
+                <a16:creationId xmlns:a16="http://schemas.microsoft.com/office/drawing/2014/main" id="{7B9F0053-8921-4C58-A9DD-F775986D5139}"/>
               </a:ext>
             </a:extLst>
           </p:cNvPr>
-          <p:cNvPicPr>
-            <a:picLocks noGrp="1" noChangeAspect="1"/>
-          </p:cNvPicPr>
+          <p:cNvSpPr>
+            <a:spLocks noGrp="1"/>
+          </p:cNvSpPr>
+          <p:nvPr>
+            <p:ph type="title"/>
+          </p:nvPr>
+        </p:nvSpPr>
+        <p:spPr/>
+        <p:txBody>
+          <a:bodyPr/>
+          <a:lstStyle/>
+          <a:p>
+            <a:r>
+              <a:rPr lang="ko-KR" altLang="en-US" dirty="0"/>
+              <a:t>목차</a:t>
+            </a:r>
+          </a:p>
+        </p:txBody>
+      </p:sp>
+      <p:sp>
+        <p:nvSpPr>
+          <p:cNvPr id="3" name="내용 개체 틀 2">
+            <a:extLst>
+              <a:ext uri="{FF2B5EF4-FFF2-40B4-BE49-F238E27FC236}">
+                <a16:creationId xmlns:a16="http://schemas.microsoft.com/office/drawing/2014/main" id="{787FC13A-35DA-415B-BDF9-4C008161B491}"/>
+              </a:ext>
+            </a:extLst>
+          </p:cNvPr>
+          <p:cNvSpPr>
+            <a:spLocks noGrp="1"/>
+          </p:cNvSpPr>
           <p:nvPr>
             <p:ph idx="1"/>
           </p:nvPr>
-        </p:nvPicPr>
-        <p:blipFill>
-          <a:blip r:embed="rId2"/>
-          <a:stretch>
-            <a:fillRect/>
-          </a:stretch>
-        </p:blipFill>
-        <p:spPr>
-          <a:xfrm>
-            <a:off x="1324029" y="51547"/>
-            <a:ext cx="9079593" cy="6754905"/>
-          </a:xfrm>
-        </p:spPr>
-      </p:pic>
+        </p:nvSpPr>
+        <p:spPr/>
+        <p:txBody>
+          <a:bodyPr/>
+          <a:lstStyle/>
+          <a:p>
+            <a:r>
+              <a:rPr lang="en-US" altLang="ko-KR" dirty="0"/>
+              <a:t> </a:t>
+            </a:r>
+            <a:r>
+              <a:rPr lang="ko-KR" altLang="en-US" dirty="0"/>
+              <a:t>완전탐색</a:t>
+            </a:r>
+            <a:endParaRPr lang="en-US" altLang="ko-KR" dirty="0"/>
+          </a:p>
+          <a:p>
+            <a:r>
+              <a:rPr lang="en-US" altLang="ko-KR" dirty="0"/>
+              <a:t> Binary Search</a:t>
+            </a:r>
+          </a:p>
+          <a:p>
+            <a:r>
+              <a:rPr lang="ko-KR" altLang="en-US" dirty="0"/>
+              <a:t> </a:t>
+            </a:r>
+            <a:r>
+              <a:rPr lang="en-US" altLang="ko-KR" dirty="0"/>
+              <a:t>GCD, LCM </a:t>
+            </a:r>
+          </a:p>
+          <a:p>
+            <a:r>
+              <a:rPr lang="en-US" altLang="ko-KR" dirty="0"/>
+              <a:t> </a:t>
+            </a:r>
+            <a:r>
+              <a:rPr lang="ko-KR" altLang="en-US" dirty="0"/>
+              <a:t>유클리드 </a:t>
+            </a:r>
+            <a:r>
+              <a:rPr lang="ko-KR" altLang="en-US" dirty="0" err="1"/>
+              <a:t>호제법</a:t>
+            </a:r>
+            <a:endParaRPr lang="en-US" altLang="ko-KR" dirty="0"/>
+          </a:p>
+          <a:p>
+            <a:r>
+              <a:rPr lang="en-US" altLang="ko-KR" dirty="0"/>
+              <a:t> Bit </a:t>
+            </a:r>
+            <a:r>
+              <a:rPr lang="ko-KR" altLang="en-US" dirty="0"/>
+              <a:t>연산</a:t>
+            </a:r>
+          </a:p>
+        </p:txBody>
+      </p:sp>
     </p:spTree>
     <p:extLst>
       <p:ext uri="{BB962C8B-B14F-4D97-AF65-F5344CB8AC3E}">
-        <p14:creationId xmlns:p14="http://schemas.microsoft.com/office/powerpoint/2010/main" val="498435747"/>
+        <p14:creationId xmlns:p14="http://schemas.microsoft.com/office/powerpoint/2010/main" val="839757777"/>
       </p:ext>
     </p:extLst>
   </p:cSld>
@@ -8743,7 +9203,7 @@
           <p:cNvPr id="2" name="제목 1">
             <a:extLst>
               <a:ext uri="{FF2B5EF4-FFF2-40B4-BE49-F238E27FC236}">
-                <a16:creationId xmlns:a16="http://schemas.microsoft.com/office/drawing/2014/main" id="{CC1B8BE5-D7E2-414D-88BC-823E447CCDFE}"/>
+                <a16:creationId xmlns:a16="http://schemas.microsoft.com/office/drawing/2014/main" id="{22A6C3E0-148D-4BB6-BC5C-A08C4A4DBD13}"/>
               </a:ext>
             </a:extLst>
           </p:cNvPr>
@@ -8760,142 +9220,62 @@
           <a:lstStyle/>
           <a:p>
             <a:r>
+              <a:rPr lang="ko-KR" altLang="en-US" dirty="0"/>
+              <a:t>완전탐색</a:t>
+            </a:r>
+          </a:p>
+        </p:txBody>
+      </p:sp>
+      <p:sp>
+        <p:nvSpPr>
+          <p:cNvPr id="3" name="내용 개체 틀 2">
+            <a:extLst>
+              <a:ext uri="{FF2B5EF4-FFF2-40B4-BE49-F238E27FC236}">
+                <a16:creationId xmlns:a16="http://schemas.microsoft.com/office/drawing/2014/main" id="{B4D45DC8-0C7F-4DD0-A5B3-F208B1718596}"/>
+              </a:ext>
+            </a:extLst>
+          </p:cNvPr>
+          <p:cNvSpPr>
+            <a:spLocks noGrp="1"/>
+          </p:cNvSpPr>
+          <p:nvPr>
+            <p:ph idx="1"/>
+          </p:nvPr>
+        </p:nvSpPr>
+        <p:spPr/>
+        <p:txBody>
+          <a:bodyPr/>
+          <a:lstStyle/>
+          <a:p>
+            <a:r>
+              <a:rPr lang="ko-KR" altLang="en-US" dirty="0"/>
+              <a:t>단순하게 모든 경우의 수를 확인해보는 기법</a:t>
+            </a:r>
+            <a:r>
               <a:rPr lang="en-US" altLang="ko-KR" dirty="0"/>
-              <a:t>Binary</a:t>
-            </a:r>
+              <a:t>!</a:t>
+            </a:r>
+          </a:p>
+          <a:p>
+            <a:endParaRPr lang="en-US" altLang="ko-KR" dirty="0"/>
+          </a:p>
+          <a:p>
             <a:r>
               <a:rPr lang="ko-KR" altLang="en-US" dirty="0"/>
-              <a:t> </a:t>
+              <a:t>데이터의 수와 직결되기 때문에 효율성을 위해서는 거의 사용하지 않으나 기본중의 기본 </a:t>
             </a:r>
             <a:r>
               <a:rPr lang="en-US" altLang="ko-KR" dirty="0"/>
-              <a:t>Search</a:t>
+              <a:t>!</a:t>
             </a:r>
             <a:endParaRPr lang="ko-KR" altLang="en-US" dirty="0"/>
-          </a:p>
-        </p:txBody>
-      </p:sp>
-      <p:sp>
-        <p:nvSpPr>
-          <p:cNvPr id="3" name="내용 개체 틀 2">
-            <a:extLst>
-              <a:ext uri="{FF2B5EF4-FFF2-40B4-BE49-F238E27FC236}">
-                <a16:creationId xmlns:a16="http://schemas.microsoft.com/office/drawing/2014/main" id="{3DA6938B-2493-4684-8900-725AEF88B883}"/>
-              </a:ext>
-            </a:extLst>
-          </p:cNvPr>
-          <p:cNvSpPr>
-            <a:spLocks noGrp="1"/>
-          </p:cNvSpPr>
-          <p:nvPr>
-            <p:ph idx="1"/>
-          </p:nvPr>
-        </p:nvSpPr>
-        <p:spPr/>
-        <p:txBody>
-          <a:bodyPr/>
-          <a:lstStyle/>
-          <a:p>
-            <a:r>
-              <a:rPr lang="en-US" altLang="ko-KR" dirty="0" err="1"/>
-              <a:t>binarySearch</a:t>
-            </a:r>
-            <a:r>
-              <a:rPr lang="en-US" altLang="ko-KR" dirty="0"/>
-              <a:t>(</a:t>
-            </a:r>
-            <a:r>
-              <a:rPr lang="ko-KR" altLang="en-US" dirty="0"/>
-              <a:t> </a:t>
-            </a:r>
-            <a:r>
-              <a:rPr lang="en-US" altLang="ko-KR" dirty="0"/>
-              <a:t>A[],</a:t>
-            </a:r>
-            <a:r>
-              <a:rPr lang="ko-KR" altLang="en-US" dirty="0"/>
-              <a:t> </a:t>
-            </a:r>
-            <a:r>
-              <a:rPr lang="en-US" altLang="ko-KR" dirty="0"/>
-              <a:t>x</a:t>
-            </a:r>
-            <a:r>
-              <a:rPr lang="ko-KR" altLang="en-US" dirty="0"/>
-              <a:t> </a:t>
-            </a:r>
-            <a:r>
-              <a:rPr lang="en-US" altLang="ko-KR" dirty="0"/>
-              <a:t>)</a:t>
-            </a:r>
-          </a:p>
-          <a:p>
-            <a:r>
-              <a:rPr lang="en-US" altLang="ko-KR" dirty="0">
-                <a:sym typeface="Wingdings" panose="05000000000000000000" pitchFamily="2" charset="2"/>
-              </a:rPr>
-              <a:t> A[i-1] &lt; x &lt;= A[</a:t>
-            </a:r>
-            <a:r>
-              <a:rPr lang="en-US" altLang="ko-KR" dirty="0" err="1">
-                <a:sym typeface="Wingdings" panose="05000000000000000000" pitchFamily="2" charset="2"/>
-              </a:rPr>
-              <a:t>i</a:t>
-            </a:r>
-            <a:r>
-              <a:rPr lang="en-US" altLang="ko-KR" dirty="0">
-                <a:sym typeface="Wingdings" panose="05000000000000000000" pitchFamily="2" charset="2"/>
-              </a:rPr>
-              <a:t>] </a:t>
-            </a:r>
-            <a:r>
-              <a:rPr lang="ko-KR" altLang="en-US" dirty="0">
-                <a:sym typeface="Wingdings" panose="05000000000000000000" pitchFamily="2" charset="2"/>
-              </a:rPr>
-              <a:t>인 </a:t>
-            </a:r>
-            <a:r>
-              <a:rPr lang="en-US" altLang="ko-KR" dirty="0">
-                <a:sym typeface="Wingdings" panose="05000000000000000000" pitchFamily="2" charset="2"/>
-              </a:rPr>
-              <a:t> </a:t>
-            </a:r>
-            <a:r>
-              <a:rPr lang="en-US" altLang="ko-KR" dirty="0" err="1">
-                <a:sym typeface="Wingdings" panose="05000000000000000000" pitchFamily="2" charset="2"/>
-              </a:rPr>
-              <a:t>i</a:t>
-            </a:r>
-            <a:r>
-              <a:rPr lang="ko-KR" altLang="en-US" dirty="0" err="1">
-                <a:sym typeface="Wingdings" panose="05000000000000000000" pitchFamily="2" charset="2"/>
-              </a:rPr>
-              <a:t>를</a:t>
-            </a:r>
-            <a:r>
-              <a:rPr lang="ko-KR" altLang="en-US" dirty="0">
-                <a:sym typeface="Wingdings" panose="05000000000000000000" pitchFamily="2" charset="2"/>
-              </a:rPr>
-              <a:t> 반환하는 것</a:t>
-            </a:r>
-            <a:endParaRPr lang="en-US" altLang="ko-KR" dirty="0">
-              <a:sym typeface="Wingdings" panose="05000000000000000000" pitchFamily="2" charset="2"/>
-            </a:endParaRPr>
-          </a:p>
-          <a:p>
-            <a:pPr marL="0" indent="0">
-              <a:buNone/>
-            </a:pPr>
-            <a:endParaRPr lang="en-US" altLang="ko-KR" dirty="0">
-              <a:sym typeface="Wingdings" panose="05000000000000000000" pitchFamily="2" charset="2"/>
-            </a:endParaRPr>
           </a:p>
         </p:txBody>
       </p:sp>
     </p:spTree>
     <p:extLst>
       <p:ext uri="{BB962C8B-B14F-4D97-AF65-F5344CB8AC3E}">
-        <p14:creationId xmlns:p14="http://schemas.microsoft.com/office/powerpoint/2010/main" val="1744329047"/>
+        <p14:creationId xmlns:p14="http://schemas.microsoft.com/office/powerpoint/2010/main" val="712997102"/>
       </p:ext>
     </p:extLst>
   </p:cSld>

</xml_diff>